<commit_message>
updated and added final ppt
</commit_message>
<xml_diff>
--- a/docs/vaswani-et-al-2017.pptx
+++ b/docs/vaswani-et-al-2017.pptx
@@ -135,6 +135,17 @@
 </p:presentation>
 </file>
 
+<file path=ppt/revisionInfo.xml><?xml version="1.0" encoding="utf-8"?>
+<p1510:revInfo xmlns:a="http://schemas.openxmlformats.org/drawingml/2006/main" xmlns:r="http://schemas.openxmlformats.org/officeDocument/2006/relationships" xmlns:p1510="http://schemas.microsoft.com/office/powerpoint/2015/10/main">
+  <p1510:revLst>
+    <p1510:client id="{17B27FFF-D0B0-832E-8715-650E9F69AC34}" v="36" dt="2023-05-02T20:44:44.276"/>
+    <p1510:client id="{20A03334-FEAC-FE18-0322-1CD7EA47E928}" v="7" dt="2023-05-02T06:14:34.217"/>
+    <p1510:client id="{2CAA68D2-6347-018F-2F67-DBED8D6AAD97}" v="8" dt="2023-05-02T23:11:54.348"/>
+    <p1510:client id="{BCBDC769-5675-41FB-56BC-7931E9DCE7E7}" v="5" dt="2023-05-03T06:03:26.593"/>
+  </p1510:revLst>
+</p1510:revInfo>
+</file>
+
 <file path=ppt/notesMasters/notesMaster1.xml><?xml version="1.0" encoding="utf-8"?>
 <p:notesMaster xmlns:a="http://schemas.openxmlformats.org/drawingml/2006/main" xmlns:r="http://schemas.openxmlformats.org/officeDocument/2006/relationships" xmlns:p="http://schemas.openxmlformats.org/presentationml/2006/main">
   <p:cSld>
@@ -217,7 +228,7 @@
           <a:p>
             <a:fld id="{B0F6F464-3D37-4C45-8CF4-0C0A2C464A37}" type="datetimeFigureOut">
               <a:rPr lang="en-US" smtClean="0"/>
-              <a:t>4/30/23</a:t>
+              <a:t>5/3/23</a:t>
             </a:fld>
             <a:endParaRPr lang="en-US"/>
           </a:p>
@@ -631,7 +642,7 @@
           <a:p>
             <a:fld id="{650B5F21-BC07-7B45-8AA2-A1E87A038008}" type="datetimeFigureOut">
               <a:rPr lang="en-US" smtClean="0"/>
-              <a:t>4/30/23</a:t>
+              <a:t>5/3/23</a:t>
             </a:fld>
             <a:endParaRPr lang="en-US"/>
           </a:p>
@@ -829,7 +840,7 @@
           <a:p>
             <a:fld id="{650B5F21-BC07-7B45-8AA2-A1E87A038008}" type="datetimeFigureOut">
               <a:rPr lang="en-US" smtClean="0"/>
-              <a:t>4/30/23</a:t>
+              <a:t>5/3/23</a:t>
             </a:fld>
             <a:endParaRPr lang="en-US"/>
           </a:p>
@@ -1037,7 +1048,7 @@
           <a:p>
             <a:fld id="{650B5F21-BC07-7B45-8AA2-A1E87A038008}" type="datetimeFigureOut">
               <a:rPr lang="en-US" smtClean="0"/>
-              <a:t>4/30/23</a:t>
+              <a:t>5/3/23</a:t>
             </a:fld>
             <a:endParaRPr lang="en-US"/>
           </a:p>
@@ -1235,7 +1246,7 @@
           <a:p>
             <a:fld id="{650B5F21-BC07-7B45-8AA2-A1E87A038008}" type="datetimeFigureOut">
               <a:rPr lang="en-US" smtClean="0"/>
-              <a:t>4/30/23</a:t>
+              <a:t>5/3/23</a:t>
             </a:fld>
             <a:endParaRPr lang="en-US"/>
           </a:p>
@@ -1510,7 +1521,7 @@
           <a:p>
             <a:fld id="{650B5F21-BC07-7B45-8AA2-A1E87A038008}" type="datetimeFigureOut">
               <a:rPr lang="en-US" smtClean="0"/>
-              <a:t>4/30/23</a:t>
+              <a:t>5/3/23</a:t>
             </a:fld>
             <a:endParaRPr lang="en-US"/>
           </a:p>
@@ -1775,7 +1786,7 @@
           <a:p>
             <a:fld id="{650B5F21-BC07-7B45-8AA2-A1E87A038008}" type="datetimeFigureOut">
               <a:rPr lang="en-US" smtClean="0"/>
-              <a:t>4/30/23</a:t>
+              <a:t>5/3/23</a:t>
             </a:fld>
             <a:endParaRPr lang="en-US"/>
           </a:p>
@@ -2187,7 +2198,7 @@
           <a:p>
             <a:fld id="{650B5F21-BC07-7B45-8AA2-A1E87A038008}" type="datetimeFigureOut">
               <a:rPr lang="en-US" smtClean="0"/>
-              <a:t>4/30/23</a:t>
+              <a:t>5/3/23</a:t>
             </a:fld>
             <a:endParaRPr lang="en-US"/>
           </a:p>
@@ -2328,7 +2339,7 @@
           <a:p>
             <a:fld id="{650B5F21-BC07-7B45-8AA2-A1E87A038008}" type="datetimeFigureOut">
               <a:rPr lang="en-US" smtClean="0"/>
-              <a:t>4/30/23</a:t>
+              <a:t>5/3/23</a:t>
             </a:fld>
             <a:endParaRPr lang="en-US"/>
           </a:p>
@@ -2441,7 +2452,7 @@
           <a:p>
             <a:fld id="{650B5F21-BC07-7B45-8AA2-A1E87A038008}" type="datetimeFigureOut">
               <a:rPr lang="en-US" smtClean="0"/>
-              <a:t>4/30/23</a:t>
+              <a:t>5/3/23</a:t>
             </a:fld>
             <a:endParaRPr lang="en-US"/>
           </a:p>
@@ -2752,7 +2763,7 @@
           <a:p>
             <a:fld id="{650B5F21-BC07-7B45-8AA2-A1E87A038008}" type="datetimeFigureOut">
               <a:rPr lang="en-US" smtClean="0"/>
-              <a:t>4/30/23</a:t>
+              <a:t>5/3/23</a:t>
             </a:fld>
             <a:endParaRPr lang="en-US"/>
           </a:p>
@@ -3040,7 +3051,7 @@
           <a:p>
             <a:fld id="{650B5F21-BC07-7B45-8AA2-A1E87A038008}" type="datetimeFigureOut">
               <a:rPr lang="en-US" smtClean="0"/>
-              <a:t>4/30/23</a:t>
+              <a:t>5/3/23</a:t>
             </a:fld>
             <a:endParaRPr lang="en-US"/>
           </a:p>
@@ -3281,7 +3292,7 @@
           <a:p>
             <a:fld id="{650B5F21-BC07-7B45-8AA2-A1E87A038008}" type="datetimeFigureOut">
               <a:rPr lang="en-US" smtClean="0"/>
-              <a:t>4/30/23</a:t>
+              <a:t>5/3/23</a:t>
             </a:fld>
             <a:endParaRPr lang="en-US"/>
           </a:p>
@@ -3735,7 +3746,7 @@
           <a:lstStyle/>
           <a:p>
             <a:r>
-              <a:rPr lang="en-US" sz="6600" dirty="0">
+              <a:rPr lang="en-US" sz="6600">
                 <a:solidFill>
                   <a:schemeClr val="bg1"/>
                 </a:solidFill>
@@ -3774,7 +3785,7 @@
           <a:lstStyle/>
           <a:p>
             <a:r>
-              <a:rPr lang="en-US" sz="2000" dirty="0">
+              <a:rPr lang="en-US" sz="2000">
                 <a:solidFill>
                   <a:srgbClr val="B9BBC5"/>
                 </a:solidFill>
@@ -3814,7 +3825,7 @@
           <a:p>
             <a:pPr algn="ctr"/>
             <a:r>
-              <a:rPr lang="en-US" sz="2000" dirty="0">
+              <a:rPr lang="en-US" sz="2000">
                 <a:solidFill>
                   <a:schemeClr val="bg1"/>
                 </a:solidFill>
@@ -3825,7 +3836,7 @@
           <a:p>
             <a:pPr algn="ctr"/>
             <a:r>
-              <a:rPr lang="en-US" sz="2000" dirty="0">
+              <a:rPr lang="en-US" sz="2000">
                 <a:solidFill>
                   <a:schemeClr val="bg1"/>
                 </a:solidFill>
@@ -3836,7 +3847,7 @@
           <a:p>
             <a:pPr algn="ctr"/>
             <a:r>
-              <a:rPr lang="en-US" sz="2000" dirty="0">
+              <a:rPr lang="en-US" sz="2000">
                 <a:solidFill>
                   <a:schemeClr val="bg1"/>
                 </a:solidFill>
@@ -3948,7 +3959,7 @@
           <a:lstStyle/>
           <a:p>
             <a:r>
-              <a:rPr lang="en-US" dirty="0">
+              <a:rPr lang="en-US">
                 <a:solidFill>
                   <a:srgbClr val="041F41"/>
                 </a:solidFill>
@@ -4080,7 +4091,7 @@
               <a:defRPr/>
             </a:pPr>
             <a:r>
-              <a:rPr lang="en-US" b="1" dirty="0">
+              <a:rPr lang="en-US" b="1">
                 <a:solidFill>
                   <a:srgbClr val="041F41"/>
                 </a:solidFill>
@@ -4090,7 +4101,7 @@
               </a:rPr>
               <a:t>ENCODER BLOCK</a:t>
             </a:r>
-            <a:endParaRPr lang="en-US" dirty="0">
+            <a:endParaRPr lang="en-US">
               <a:solidFill>
                 <a:srgbClr val="041F41"/>
               </a:solidFill>
@@ -4423,7 +4434,7 @@
               <a:lstStyle/>
               <a:p>
                 <a:r>
-                  <a:rPr lang="en-US" sz="1400" b="1" dirty="0">
+                  <a:rPr lang="en-US" sz="1400" b="1">
                     <a:solidFill>
                       <a:schemeClr val="bg1"/>
                     </a:solidFill>
@@ -4471,7 +4482,7 @@
                   <a:defRPr/>
                 </a:pPr>
                 <a:r>
-                  <a:rPr lang="en-US" sz="1000" dirty="0">
+                  <a:rPr lang="en-US" sz="1000">
                     <a:solidFill>
                       <a:schemeClr val="bg1"/>
                     </a:solidFill>
@@ -4520,7 +4531,7 @@
                 <a:defRPr/>
               </a:pPr>
               <a:r>
-                <a:rPr lang="en-US" sz="1000" dirty="0">
+                <a:rPr lang="en-US" sz="1000">
                   <a:solidFill>
                     <a:srgbClr val="605E63"/>
                   </a:solidFill>
@@ -4531,7 +4542,7 @@
                 <a:t>Stack of N=6 identical layers consisting of multi-head self attention and second is position wise fully connected feed-forward network followed by residual connection of layer normalization. This produces output of dimension d</a:t>
               </a:r>
               <a:r>
-                <a:rPr lang="en-US" sz="1000" baseline="-25000" dirty="0">
+                <a:rPr lang="en-US" sz="1000" baseline="-25000">
                   <a:solidFill>
                     <a:srgbClr val="605E63"/>
                   </a:solidFill>
@@ -4542,7 +4553,7 @@
                 <a:t>model</a:t>
               </a:r>
               <a:r>
-                <a:rPr lang="en-US" sz="1000" dirty="0">
+                <a:rPr lang="en-US" sz="1000">
                   <a:solidFill>
                     <a:srgbClr val="605E63"/>
                   </a:solidFill>
@@ -4821,7 +4832,7 @@
               <a:p>
                 <a:pPr algn="r"/>
                 <a:r>
-                  <a:rPr lang="en-US" sz="1400" b="1" dirty="0">
+                  <a:rPr lang="en-US" sz="1400" b="1">
                     <a:solidFill>
                       <a:schemeClr val="bg1"/>
                     </a:solidFill>
@@ -4869,7 +4880,7 @@
                   <a:defRPr/>
                 </a:pPr>
                 <a:r>
-                  <a:rPr lang="en-US" sz="1000" dirty="0">
+                  <a:rPr lang="en-US" sz="1000">
                     <a:solidFill>
                       <a:schemeClr val="bg1"/>
                     </a:solidFill>
@@ -4918,7 +4929,7 @@
                 <a:defRPr/>
               </a:pPr>
               <a:r>
-                <a:rPr lang="en-US" sz="1000" dirty="0">
+                <a:rPr lang="en-US" sz="1000">
                   <a:solidFill>
                     <a:srgbClr val="605E63"/>
                   </a:solidFill>
@@ -5025,7 +5036,7 @@
               <a:defRPr/>
             </a:pPr>
             <a:r>
-              <a:rPr lang="en-US" b="1" dirty="0">
+              <a:rPr lang="en-US" b="1">
                 <a:solidFill>
                   <a:srgbClr val="041F41"/>
                 </a:solidFill>
@@ -5035,7 +5046,7 @@
               </a:rPr>
               <a:t>DECODER BLOCKS</a:t>
             </a:r>
-            <a:endParaRPr lang="en-US" dirty="0">
+            <a:endParaRPr lang="en-US">
               <a:solidFill>
                 <a:srgbClr val="041F41"/>
               </a:solidFill>
@@ -5081,7 +5092,7 @@
               <a:defRPr/>
             </a:pPr>
             <a:r>
-              <a:rPr lang="en-US" sz="1100" dirty="0">
+              <a:rPr lang="en-US" sz="1100">
                 <a:solidFill>
                   <a:srgbClr val="041F41"/>
                 </a:solidFill>
@@ -5129,7 +5140,7 @@
               <a:defRPr/>
             </a:pPr>
             <a:r>
-              <a:rPr lang="en-US" sz="1100" dirty="0">
+              <a:rPr lang="en-US" sz="1100">
                 <a:solidFill>
                   <a:srgbClr val="041F41"/>
                 </a:solidFill>
@@ -5879,7 +5890,7 @@
           <a:lstStyle/>
           <a:p>
             <a:r>
-              <a:rPr lang="en-US" dirty="0">
+              <a:rPr lang="en-US">
                 <a:solidFill>
                   <a:srgbClr val="041F41"/>
                 </a:solidFill>
@@ -6292,7 +6303,7 @@
               <a:defRPr/>
             </a:pPr>
             <a:r>
-              <a:rPr lang="en-US" b="1" dirty="0">
+              <a:rPr lang="en-US" b="1">
                 <a:solidFill>
                   <a:srgbClr val="041F41"/>
                 </a:solidFill>
@@ -6302,7 +6313,7 @@
               </a:rPr>
               <a:t>TRANSFORMER</a:t>
             </a:r>
-            <a:endParaRPr lang="en-US" dirty="0">
+            <a:endParaRPr lang="en-US">
               <a:solidFill>
                 <a:srgbClr val="041F41"/>
               </a:solidFill>
@@ -6635,7 +6646,7 @@
               <a:lstStyle/>
               <a:p>
                 <a:r>
-                  <a:rPr lang="en-US" sz="1400" b="1" dirty="0">
+                  <a:rPr lang="en-US" sz="1400" b="1">
                     <a:solidFill>
                       <a:schemeClr val="bg1"/>
                     </a:solidFill>
@@ -6683,7 +6694,7 @@
                   <a:defRPr/>
                 </a:pPr>
                 <a:r>
-                  <a:rPr lang="en-US" sz="1000" dirty="0">
+                  <a:rPr lang="en-US" sz="1000">
                     <a:solidFill>
                       <a:schemeClr val="bg1"/>
                     </a:solidFill>
@@ -6732,7 +6743,7 @@
                 <a:defRPr/>
               </a:pPr>
               <a:r>
-                <a:rPr lang="en-US" sz="1000" dirty="0">
+                <a:rPr lang="en-US" sz="1000">
                   <a:solidFill>
                     <a:srgbClr val="605E63"/>
                   </a:solidFill>
@@ -7011,7 +7022,7 @@
               <a:p>
                 <a:pPr algn="r"/>
                 <a:r>
-                  <a:rPr lang="en-US" sz="1400" b="1" dirty="0">
+                  <a:rPr lang="en-US" sz="1400" b="1">
                     <a:solidFill>
                       <a:schemeClr val="bg1"/>
                     </a:solidFill>
@@ -7059,7 +7070,7 @@
                   <a:defRPr/>
                 </a:pPr>
                 <a:r>
-                  <a:rPr lang="en-US" sz="1000" dirty="0">
+                  <a:rPr lang="en-US" sz="1000">
                     <a:solidFill>
                       <a:schemeClr val="bg1"/>
                     </a:solidFill>
@@ -7108,7 +7119,7 @@
                 <a:defRPr/>
               </a:pPr>
               <a:r>
-                <a:rPr lang="en-US" sz="1000" dirty="0">
+                <a:rPr lang="en-US" sz="1000">
                   <a:solidFill>
                     <a:srgbClr val="605E63"/>
                   </a:solidFill>
@@ -7119,7 +7130,7 @@
                 <a:t>Used Adam optimizer with beta1=0.9, beta2=0.98, and epsilon=10</a:t>
               </a:r>
               <a:r>
-                <a:rPr lang="en-US" sz="1000" baseline="30000" dirty="0">
+                <a:rPr lang="en-US" sz="1000" baseline="30000">
                   <a:solidFill>
                     <a:srgbClr val="605E63"/>
                   </a:solidFill>
@@ -7130,7 +7141,7 @@
                 <a:t>-9</a:t>
               </a:r>
               <a:r>
-                <a:rPr lang="en-US" sz="1000" dirty="0">
+                <a:rPr lang="en-US" sz="1000">
                   <a:solidFill>
                     <a:srgbClr val="605E63"/>
                   </a:solidFill>
@@ -7237,7 +7248,7 @@
               <a:defRPr/>
             </a:pPr>
             <a:r>
-              <a:rPr lang="en-US" b="1" dirty="0">
+              <a:rPr lang="en-US" b="1">
                 <a:solidFill>
                   <a:srgbClr val="041F41"/>
                 </a:solidFill>
@@ -7247,7 +7258,7 @@
               </a:rPr>
               <a:t>TRAINING</a:t>
             </a:r>
-            <a:endParaRPr lang="en-US" dirty="0">
+            <a:endParaRPr lang="en-US">
               <a:solidFill>
                 <a:srgbClr val="041F41"/>
               </a:solidFill>
@@ -7293,7 +7304,7 @@
               <a:defRPr/>
             </a:pPr>
             <a:r>
-              <a:rPr lang="en-US" sz="1100" dirty="0">
+              <a:rPr lang="en-US" sz="1100">
                 <a:solidFill>
                   <a:srgbClr val="041F41"/>
                 </a:solidFill>
@@ -7341,7 +7352,7 @@
               <a:defRPr/>
             </a:pPr>
             <a:r>
-              <a:rPr lang="en-US" sz="1100" dirty="0">
+              <a:rPr lang="en-US" sz="1100">
                 <a:solidFill>
                   <a:srgbClr val="041F41"/>
                 </a:solidFill>
@@ -8089,7 +8100,7 @@
           <a:lstStyle/>
           <a:p>
             <a:r>
-              <a:rPr lang="en-US" dirty="0">
+              <a:rPr lang="en-US">
                 <a:solidFill>
                   <a:srgbClr val="041F41"/>
                 </a:solidFill>
@@ -8218,7 +8229,7 @@
               <a:buChar char="•"/>
             </a:pPr>
             <a:r>
-              <a:rPr lang="en-US" sz="2000" dirty="0">
+              <a:rPr lang="en-US" sz="2000">
                 <a:solidFill>
                   <a:srgbClr val="041F41"/>
                 </a:solidFill>
@@ -8232,7 +8243,7 @@
               <a:buChar char="•"/>
             </a:pPr>
             <a:r>
-              <a:rPr lang="en-US" sz="2000" dirty="0">
+              <a:rPr lang="en-US" sz="2000">
                 <a:solidFill>
                   <a:srgbClr val="041F41"/>
                 </a:solidFill>
@@ -8246,7 +8257,7 @@
               <a:buChar char="•"/>
             </a:pPr>
             <a:r>
-              <a:rPr lang="en-US" sz="2000" dirty="0">
+              <a:rPr lang="en-US" sz="2000">
                 <a:solidFill>
                   <a:srgbClr val="041F41"/>
                 </a:solidFill>
@@ -8260,7 +8271,7 @@
               <a:buChar char="•"/>
             </a:pPr>
             <a:r>
-              <a:rPr lang="en-US" sz="2000" dirty="0">
+              <a:rPr lang="en-US" sz="2000">
                 <a:solidFill>
                   <a:srgbClr val="041F41"/>
                 </a:solidFill>
@@ -8268,7 +8279,7 @@
               <a:t>36 million sentence pairs (en-</a:t>
             </a:r>
             <a:r>
-              <a:rPr lang="en-US" sz="2000" dirty="0" err="1">
+              <a:rPr lang="en-US" sz="2000" err="1">
                 <a:solidFill>
                   <a:srgbClr val="041F41"/>
                 </a:solidFill>
@@ -8276,7 +8287,7 @@
               <a:t>fr</a:t>
             </a:r>
             <a:r>
-              <a:rPr lang="en-US" sz="2000" dirty="0">
+              <a:rPr lang="en-US" sz="2000">
                 <a:solidFill>
                   <a:srgbClr val="041F41"/>
                 </a:solidFill>
@@ -8290,7 +8301,7 @@
               <a:buChar char="•"/>
             </a:pPr>
             <a:r>
-              <a:rPr lang="en-US" sz="2000" dirty="0">
+              <a:rPr lang="en-US" sz="2000">
                 <a:solidFill>
                   <a:srgbClr val="041F41"/>
                 </a:solidFill>
@@ -8304,7 +8315,7 @@
               <a:buChar char="•"/>
             </a:pPr>
             <a:r>
-              <a:rPr lang="en-US" sz="2000" dirty="0">
+              <a:rPr lang="en-US" sz="2000">
                 <a:solidFill>
                   <a:srgbClr val="041F41"/>
                 </a:solidFill>
@@ -8318,7 +8329,7 @@
               <a:buChar char="•"/>
             </a:pPr>
             <a:r>
-              <a:rPr lang="en-US" sz="2000" dirty="0">
+              <a:rPr lang="en-US" sz="2000">
                 <a:solidFill>
                   <a:srgbClr val="041F41"/>
                 </a:solidFill>
@@ -8332,7 +8343,7 @@
               <a:buChar char="•"/>
             </a:pPr>
             <a:r>
-              <a:rPr lang="en-US" sz="2000" dirty="0">
+              <a:rPr lang="en-US" sz="2000">
                 <a:solidFill>
                   <a:srgbClr val="041F41"/>
                 </a:solidFill>
@@ -8345,7 +8356,7 @@
               <a:buFont typeface="Arial" panose="020B0604020202020204" pitchFamily="34" charset="0"/>
               <a:buChar char="•"/>
             </a:pPr>
-            <a:endParaRPr lang="en-US" sz="2000" dirty="0">
+            <a:endParaRPr lang="en-US" sz="2000">
               <a:solidFill>
                 <a:srgbClr val="041F41"/>
               </a:solidFill>
@@ -8386,7 +8397,7 @@
               <a:buChar char="•"/>
             </a:pPr>
             <a:r>
-              <a:rPr lang="en-US" sz="2000" dirty="0">
+              <a:rPr lang="en-US" sz="2000">
                 <a:solidFill>
                   <a:srgbClr val="041F41"/>
                 </a:solidFill>
@@ -8400,7 +8411,7 @@
               <a:buChar char="•"/>
             </a:pPr>
             <a:r>
-              <a:rPr lang="en-US" sz="2000" dirty="0">
+              <a:rPr lang="en-US" sz="2000">
                 <a:solidFill>
                   <a:srgbClr val="041F41"/>
                 </a:solidFill>
@@ -8414,7 +8425,7 @@
               <a:buChar char="•"/>
             </a:pPr>
             <a:r>
-              <a:rPr lang="en-US" sz="2000" dirty="0">
+              <a:rPr lang="en-US" sz="2000">
                 <a:solidFill>
                   <a:srgbClr val="041F41"/>
                 </a:solidFill>
@@ -8428,7 +8439,7 @@
               <a:buChar char="•"/>
             </a:pPr>
             <a:r>
-              <a:rPr lang="en-US" sz="2000" dirty="0">
+              <a:rPr lang="en-US" sz="2000">
                 <a:solidFill>
                   <a:srgbClr val="041F41"/>
                 </a:solidFill>
@@ -8442,7 +8453,7 @@
               <a:buChar char="•"/>
             </a:pPr>
             <a:r>
-              <a:rPr lang="en-US" sz="2000" dirty="0">
+              <a:rPr lang="en-US" sz="2000">
                 <a:solidFill>
                   <a:srgbClr val="041F41"/>
                 </a:solidFill>
@@ -8456,7 +8467,7 @@
               <a:buChar char="•"/>
             </a:pPr>
             <a:r>
-              <a:rPr lang="en-US" sz="2000" dirty="0">
+              <a:rPr lang="en-US" sz="2000">
                 <a:solidFill>
                   <a:srgbClr val="041F41"/>
                 </a:solidFill>
@@ -8470,7 +8481,7 @@
               <a:buChar char="•"/>
             </a:pPr>
             <a:r>
-              <a:rPr lang="en-US" sz="2000" dirty="0">
+              <a:rPr lang="en-US" sz="2000">
                 <a:solidFill>
                   <a:srgbClr val="041F41"/>
                 </a:solidFill>
@@ -8484,7 +8495,7 @@
               <a:buChar char="•"/>
             </a:pPr>
             <a:r>
-              <a:rPr lang="en-US" sz="2000" dirty="0">
+              <a:rPr lang="en-US" sz="2000">
                 <a:solidFill>
                   <a:srgbClr val="041F41"/>
                 </a:solidFill>
@@ -8498,7 +8509,7 @@
               <a:buChar char="•"/>
             </a:pPr>
             <a:r>
-              <a:rPr lang="en-US" sz="2000" dirty="0">
+              <a:rPr lang="en-US" sz="2000">
                 <a:solidFill>
                   <a:srgbClr val="041F41"/>
                 </a:solidFill>
@@ -8512,7 +8523,7 @@
               <a:buChar char="•"/>
             </a:pPr>
             <a:r>
-              <a:rPr lang="en-US" sz="2000" dirty="0">
+              <a:rPr lang="en-US" sz="2000">
                 <a:solidFill>
                   <a:srgbClr val="041F41"/>
                 </a:solidFill>
@@ -8551,7 +8562,7 @@
           <a:lstStyle/>
           <a:p>
             <a:r>
-              <a:rPr lang="en-US" sz="1600" dirty="0">
+              <a:rPr lang="en-US" sz="1600">
                 <a:solidFill>
                   <a:srgbClr val="041F41"/>
                 </a:solidFill>
@@ -8559,7 +8570,7 @@
               <a:t>**</a:t>
             </a:r>
             <a:r>
-              <a:rPr lang="en-US" sz="1600" dirty="0">
+              <a:rPr lang="en-US" sz="1600">
                 <a:solidFill>
                   <a:srgbClr val="041F41"/>
                 </a:solidFill>
@@ -8567,7 +8578,7 @@
               </a:rPr>
               <a:t>The Illustrated Transformer</a:t>
             </a:r>
-            <a:endParaRPr lang="en-US" sz="1600" dirty="0">
+            <a:endParaRPr lang="en-US" sz="1600">
               <a:solidFill>
                 <a:srgbClr val="041F41"/>
               </a:solidFill>
@@ -10568,7 +10579,7 @@
           <a:lstStyle/>
           <a:p>
             <a:r>
-              <a:rPr lang="en-US" dirty="0">
+              <a:rPr lang="en-US">
                 <a:solidFill>
                   <a:srgbClr val="041F41"/>
                 </a:solidFill>
@@ -10650,7 +10661,7 @@
           <a:lstStyle/>
           <a:p>
             <a:r>
-              <a:rPr lang="en-US" sz="2000" dirty="0">
+              <a:rPr lang="en-US" sz="2000">
                 <a:solidFill>
                   <a:srgbClr val="041F41"/>
                 </a:solidFill>
@@ -10660,7 +10671,7 @@
           </a:p>
           <a:p>
             <a:r>
-              <a:rPr lang="en-US" sz="2000" dirty="0">
+              <a:rPr lang="en-US" sz="2000">
                 <a:solidFill>
                   <a:srgbClr val="041F41"/>
                 </a:solidFill>
@@ -10670,7 +10681,7 @@
           </a:p>
           <a:p>
             <a:r>
-              <a:rPr lang="en-US" sz="2000" dirty="0">
+              <a:rPr lang="en-US" sz="2000">
                 <a:solidFill>
                   <a:srgbClr val="041F41"/>
                 </a:solidFill>
@@ -10680,7 +10691,7 @@
           </a:p>
           <a:p>
             <a:r>
-              <a:rPr lang="en-US" sz="2000" dirty="0">
+              <a:rPr lang="en-US" sz="2000">
                 <a:solidFill>
                   <a:srgbClr val="041F41"/>
                 </a:solidFill>
@@ -10692,7 +10703,7 @@
             <a:pPr marL="0" indent="0">
               <a:buNone/>
             </a:pPr>
-            <a:endParaRPr lang="en-US" sz="2000" dirty="0">
+            <a:endParaRPr lang="en-US" sz="2000">
               <a:solidFill>
                 <a:srgbClr val="041F41"/>
               </a:solidFill>
@@ -10760,7 +10771,7 @@
                     <a:lstStyle/>
                     <a:p>
                       <a:r>
-                        <a:rPr lang="en-US" dirty="0">
+                        <a:rPr lang="en-US">
                           <a:solidFill>
                             <a:schemeClr val="bg1"/>
                           </a:solidFill>
@@ -10815,7 +10826,7 @@
                     <a:lstStyle/>
                     <a:p>
                       <a:r>
-                        <a:rPr lang="en-US" dirty="0">
+                        <a:rPr lang="en-US">
                           <a:solidFill>
                             <a:schemeClr val="bg1"/>
                           </a:solidFill>
@@ -10870,7 +10881,7 @@
                     <a:lstStyle/>
                     <a:p>
                       <a:r>
-                        <a:rPr lang="en-US" dirty="0">
+                        <a:rPr lang="en-US">
                           <a:solidFill>
                             <a:schemeClr val="bg1"/>
                           </a:solidFill>
@@ -10932,7 +10943,7 @@
                     <a:lstStyle/>
                     <a:p>
                       <a:r>
-                        <a:rPr lang="en-US" dirty="0">
+                        <a:rPr lang="en-US">
                           <a:solidFill>
                             <a:srgbClr val="041F41"/>
                           </a:solidFill>
@@ -10986,7 +10997,7 @@
                     <a:lstStyle/>
                     <a:p>
                       <a:r>
-                        <a:rPr lang="en-US" dirty="0">
+                        <a:rPr lang="en-US">
                           <a:solidFill>
                             <a:srgbClr val="041F41"/>
                           </a:solidFill>
@@ -11040,7 +11051,7 @@
                     <a:lstStyle/>
                     <a:p>
                       <a:r>
-                        <a:rPr lang="en-US" dirty="0">
+                        <a:rPr lang="en-US">
                           <a:solidFill>
                             <a:srgbClr val="041F41"/>
                           </a:solidFill>
@@ -11101,7 +11112,7 @@
                     <a:lstStyle/>
                     <a:p>
                       <a:r>
-                        <a:rPr lang="en-US" dirty="0">
+                        <a:rPr lang="en-US">
                           <a:solidFill>
                             <a:srgbClr val="041F41"/>
                           </a:solidFill>
@@ -11155,7 +11166,7 @@
                     <a:lstStyle/>
                     <a:p>
                       <a:r>
-                        <a:rPr lang="en-US" dirty="0">
+                        <a:rPr lang="en-US">
                           <a:solidFill>
                             <a:srgbClr val="041F41"/>
                           </a:solidFill>
@@ -11209,7 +11220,7 @@
                     <a:lstStyle/>
                     <a:p>
                       <a:r>
-                        <a:rPr lang="en-US" dirty="0">
+                        <a:rPr lang="en-US">
                           <a:solidFill>
                             <a:srgbClr val="041F41"/>
                           </a:solidFill>
@@ -11324,7 +11335,7 @@
           <a:lstStyle/>
           <a:p>
             <a:r>
-              <a:rPr lang="en-US" dirty="0">
+              <a:rPr lang="en-US">
                 <a:solidFill>
                   <a:srgbClr val="041F41"/>
                 </a:solidFill>
@@ -11468,7 +11479,7 @@
           <a:lstStyle/>
           <a:p>
             <a:r>
-              <a:rPr lang="en-US" sz="1600" dirty="0">
+              <a:rPr lang="en-US" sz="1600">
                 <a:solidFill>
                   <a:srgbClr val="041F41"/>
                 </a:solidFill>
@@ -11507,7 +11518,7 @@
           <a:lstStyle/>
           <a:p>
             <a:r>
-              <a:rPr lang="en-US" sz="1600" dirty="0">
+              <a:rPr lang="en-US" sz="1600">
                 <a:solidFill>
                   <a:srgbClr val="041F41"/>
                 </a:solidFill>
@@ -11574,7 +11585,7 @@
           <a:lstStyle/>
           <a:p>
             <a:r>
-              <a:rPr lang="en-US" dirty="0">
+              <a:rPr lang="en-US">
                 <a:solidFill>
                   <a:srgbClr val="041F41"/>
                 </a:solidFill>
@@ -11613,7 +11624,7 @@
           <a:lstStyle/>
           <a:p>
             <a:r>
-              <a:rPr lang="en-US" sz="2000" dirty="0">
+              <a:rPr lang="en-US" sz="2000">
                 <a:solidFill>
                   <a:srgbClr val="041F41"/>
                 </a:solidFill>
@@ -11622,7 +11633,7 @@
               <a:t>The baseline transformer uses O(n</a:t>
             </a:r>
             <a:r>
-              <a:rPr lang="en-US" sz="2000" baseline="30000" dirty="0">
+              <a:rPr lang="en-US" sz="2000" baseline="30000">
                 <a:solidFill>
                   <a:srgbClr val="041F41"/>
                 </a:solidFill>
@@ -11631,7 +11642,7 @@
               <a:t>2</a:t>
             </a:r>
             <a:r>
-              <a:rPr lang="en-US" sz="2000" dirty="0">
+              <a:rPr lang="en-US" sz="2000">
                 <a:solidFill>
                   <a:srgbClr val="041F41"/>
                 </a:solidFill>
@@ -11643,14 +11654,14 @@
           <a:p>
             <a:pPr lvl="1"/>
             <a:r>
-              <a:rPr lang="en-US" sz="2000" dirty="0">
+              <a:rPr lang="en-US" sz="2000">
                 <a:solidFill>
                   <a:srgbClr val="041F41"/>
                 </a:solidFill>
               </a:rPr>
               <a:t>Increasing size of length increases computation quadratically.</a:t>
             </a:r>
-            <a:endParaRPr lang="en-US" sz="2000" dirty="0">
+            <a:endParaRPr lang="en-US" sz="2000">
               <a:solidFill>
                 <a:srgbClr val="041F41"/>
               </a:solidFill>
@@ -11659,7 +11670,7 @@
           </a:p>
           <a:p>
             <a:r>
-              <a:rPr lang="en-US" sz="2000" dirty="0">
+              <a:rPr lang="en-US" sz="2000">
                 <a:solidFill>
                   <a:srgbClr val="041F41"/>
                 </a:solidFill>
@@ -11669,7 +11680,7 @@
           </a:p>
           <a:p>
             <a:r>
-              <a:rPr lang="en-US" sz="2000" dirty="0">
+              <a:rPr lang="en-US" sz="2000">
                 <a:solidFill>
                   <a:srgbClr val="041F41"/>
                 </a:solidFill>
@@ -11681,7 +11692,7 @@
           <a:p>
             <a:pPr lvl="1"/>
             <a:r>
-              <a:rPr lang="en-US" sz="2000" dirty="0">
+              <a:rPr lang="en-US" sz="2000">
                 <a:solidFill>
                   <a:srgbClr val="041F41"/>
                 </a:solidFill>
@@ -11692,7 +11703,7 @@
           </a:p>
           <a:p>
             <a:r>
-              <a:rPr lang="en-US" sz="2000" dirty="0">
+              <a:rPr lang="en-US" sz="2000">
                 <a:solidFill>
                   <a:srgbClr val="041F41"/>
                 </a:solidFill>
@@ -11703,7 +11714,7 @@
           <a:p>
             <a:pPr lvl="1"/>
             <a:r>
-              <a:rPr lang="en-US" sz="2000" dirty="0">
+              <a:rPr lang="en-US" sz="2000">
                 <a:solidFill>
                   <a:srgbClr val="041F41"/>
                 </a:solidFill>
@@ -11715,14 +11726,14 @@
           <a:p>
             <a:pPr lvl="1"/>
             <a:r>
-              <a:rPr lang="en-US" sz="2000" dirty="0">
+              <a:rPr lang="en-US" sz="2000">
                 <a:solidFill>
                   <a:srgbClr val="041F41"/>
                 </a:solidFill>
               </a:rPr>
               <a:t>Limited ability to update state.</a:t>
             </a:r>
-            <a:endParaRPr lang="en-US" sz="2000" dirty="0">
+            <a:endParaRPr lang="en-US" sz="2000">
               <a:solidFill>
                 <a:srgbClr val="041F41"/>
               </a:solidFill>
@@ -11841,7 +11852,7 @@
           <a:lstStyle/>
           <a:p>
             <a:r>
-              <a:rPr lang="en-US" sz="6600" dirty="0">
+              <a:rPr lang="en-US" sz="6600">
                 <a:solidFill>
                   <a:schemeClr val="bg1"/>
                 </a:solidFill>
@@ -12038,7 +12049,7 @@
           <a:lstStyle/>
           <a:p>
             <a:r>
-              <a:rPr lang="en-US" dirty="0">
+              <a:rPr lang="en-US">
                 <a:solidFill>
                   <a:srgbClr val="041F41"/>
                 </a:solidFill>
@@ -12077,7 +12088,7 @@
           <a:lstStyle/>
           <a:p>
             <a:r>
-              <a:rPr lang="en-US" sz="2000" dirty="0">
+              <a:rPr lang="en-US" sz="2000">
                 <a:solidFill>
                   <a:srgbClr val="041F41"/>
                 </a:solidFill>
@@ -12085,7 +12096,7 @@
               <a:t>The complete working code with instructions on how to run and details is available at </a:t>
             </a:r>
             <a:r>
-              <a:rPr lang="en-US" sz="2000" dirty="0">
+              <a:rPr lang="en-US" sz="2000">
                 <a:solidFill>
                   <a:srgbClr val="041F41"/>
                 </a:solidFill>
@@ -12095,7 +12106,7 @@
               </a:rPr>
               <a:t>https://github.com/aniket414/vaswani-et-al-2017</a:t>
             </a:r>
-            <a:endParaRPr lang="en-US" sz="2000" dirty="0">
+            <a:endParaRPr lang="en-US" sz="2000">
               <a:solidFill>
                 <a:srgbClr val="041F41"/>
               </a:solidFill>
@@ -12105,7 +12116,7 @@
           </a:p>
           <a:p>
             <a:r>
-              <a:rPr lang="en-US" sz="2000" dirty="0">
+              <a:rPr lang="en-US" sz="2000">
                 <a:solidFill>
                   <a:srgbClr val="041F41"/>
                 </a:solidFill>
@@ -12116,7 +12127,7 @@
           <a:p>
             <a:pPr lvl="1"/>
             <a:r>
-              <a:rPr lang="en-US" sz="2000" dirty="0">
+              <a:rPr lang="en-US" sz="2000">
                 <a:solidFill>
                   <a:srgbClr val="041F41"/>
                 </a:solidFill>
@@ -12124,7 +12135,7 @@
               <a:t>Dataset: </a:t>
             </a:r>
             <a:r>
-              <a:rPr lang="en-US" sz="2000" dirty="0">
+              <a:rPr lang="en-US" sz="2000">
                 <a:solidFill>
                   <a:srgbClr val="041F41"/>
                 </a:solidFill>
@@ -12132,7 +12143,7 @@
               </a:rPr>
               <a:t>IIT Bombay English-Hindi Corpus</a:t>
             </a:r>
-            <a:endParaRPr lang="en-US" sz="2000" dirty="0">
+            <a:endParaRPr lang="en-US" sz="2000">
               <a:solidFill>
                 <a:srgbClr val="041F41"/>
               </a:solidFill>
@@ -12141,7 +12152,7 @@
           <a:p>
             <a:pPr lvl="1"/>
             <a:r>
-              <a:rPr lang="en-US" sz="2000" dirty="0">
+              <a:rPr lang="en-US" sz="2000">
                 <a:solidFill>
                   <a:srgbClr val="041F41"/>
                 </a:solidFill>
@@ -12149,7 +12160,7 @@
               <a:t>Tokenizer: </a:t>
             </a:r>
             <a:r>
-              <a:rPr lang="en-US" sz="2000" dirty="0">
+              <a:rPr lang="en-US" sz="2000">
                 <a:solidFill>
                   <a:srgbClr val="041F41"/>
                 </a:solidFill>
@@ -12157,7 +12168,7 @@
               </a:rPr>
               <a:t>Indic language NLP library</a:t>
             </a:r>
-            <a:endParaRPr lang="en-US" sz="2000" dirty="0">
+            <a:endParaRPr lang="en-US" sz="2000">
               <a:solidFill>
                 <a:srgbClr val="041F41"/>
               </a:solidFill>
@@ -12265,7 +12276,7 @@
           <a:lstStyle/>
           <a:p>
             <a:r>
-              <a:rPr lang="en-US" dirty="0">
+              <a:rPr lang="en-US">
                 <a:solidFill>
                   <a:srgbClr val="041F41"/>
                 </a:solidFill>
@@ -12304,7 +12315,7 @@
           <a:lstStyle/>
           <a:p>
             <a:r>
-              <a:rPr lang="en-US" sz="2000" dirty="0">
+              <a:rPr lang="en-US" sz="2000">
                 <a:solidFill>
                   <a:srgbClr val="041F41"/>
                 </a:solidFill>
@@ -12312,7 +12323,7 @@
               <a:t>The byte pair encoding parts are borrowed from </a:t>
             </a:r>
             <a:r>
-              <a:rPr lang="en-US" sz="2000" dirty="0">
+              <a:rPr lang="en-US" sz="2000">
                 <a:solidFill>
                   <a:srgbClr val="041F41"/>
                 </a:solidFill>
@@ -12321,7 +12332,7 @@
               <a:t>subword-nmt</a:t>
             </a:r>
             <a:r>
-              <a:rPr lang="en-US" sz="2000" dirty="0">
+              <a:rPr lang="en-US" sz="2000">
                 <a:solidFill>
                   <a:srgbClr val="041F41"/>
                 </a:solidFill>
@@ -12331,7 +12342,7 @@
           </a:p>
           <a:p>
             <a:r>
-              <a:rPr lang="en-US" sz="2000" dirty="0">
+              <a:rPr lang="en-US" sz="2000">
                 <a:solidFill>
                   <a:srgbClr val="041F41"/>
                 </a:solidFill>
@@ -12339,7 +12350,7 @@
               <a:t>Andrej Karpathy youtube video “</a:t>
             </a:r>
             <a:r>
-              <a:rPr lang="en-US" sz="2000" dirty="0">
+              <a:rPr lang="en-US" sz="2000">
                 <a:solidFill>
                   <a:srgbClr val="041F41"/>
                 </a:solidFill>
@@ -12348,7 +12359,7 @@
               <a:t>Let's build GPT: from scratch, in code, spelled out</a:t>
             </a:r>
             <a:r>
-              <a:rPr lang="en-US" sz="2000" dirty="0">
+              <a:rPr lang="en-US" sz="2000">
                 <a:solidFill>
                   <a:srgbClr val="041F41"/>
                 </a:solidFill>
@@ -12358,7 +12369,7 @@
           </a:p>
           <a:p>
             <a:r>
-              <a:rPr lang="en-US" sz="2000" dirty="0">
+              <a:rPr lang="en-US" sz="2000">
                 <a:solidFill>
                   <a:srgbClr val="041F41"/>
                 </a:solidFill>
@@ -12366,7 +12377,7 @@
               <a:t>Aladdin Persson youtube video “</a:t>
             </a:r>
             <a:r>
-              <a:rPr lang="en-US" sz="2000" dirty="0">
+              <a:rPr lang="en-US" sz="2000">
                 <a:solidFill>
                   <a:srgbClr val="041F41"/>
                 </a:solidFill>
@@ -12375,7 +12386,7 @@
               <a:t>Pytorch Transformers</a:t>
             </a:r>
             <a:r>
-              <a:rPr lang="en-US" sz="2000" dirty="0">
+              <a:rPr lang="en-US" sz="2000">
                 <a:solidFill>
                   <a:srgbClr val="041F41"/>
                 </a:solidFill>
@@ -12385,7 +12396,7 @@
           </a:p>
           <a:p>
             <a:r>
-              <a:rPr lang="en-US" sz="2000" dirty="0">
+              <a:rPr lang="en-US" sz="2000">
                 <a:solidFill>
                   <a:srgbClr val="041F41"/>
                 </a:solidFill>
@@ -12394,7 +12405,7 @@
               <a:t>The Illustrated Transformer</a:t>
             </a:r>
             <a:r>
-              <a:rPr lang="en-US" sz="2000" dirty="0">
+              <a:rPr lang="en-US" sz="2000">
                 <a:solidFill>
                   <a:srgbClr val="041F41"/>
                 </a:solidFill>
@@ -12404,7 +12415,7 @@
           </a:p>
           <a:p>
             <a:r>
-              <a:rPr lang="en-US" sz="2000" dirty="0">
+              <a:rPr lang="en-US" sz="2000">
                 <a:solidFill>
                   <a:srgbClr val="041F41"/>
                 </a:solidFill>
@@ -12412,7 +12423,7 @@
               <a:t>Pytorch tutorial “</a:t>
             </a:r>
             <a:r>
-              <a:rPr lang="en-US" sz="2000" dirty="0">
+              <a:rPr lang="en-US" sz="2000">
                 <a:solidFill>
                   <a:srgbClr val="041F41"/>
                 </a:solidFill>
@@ -12421,7 +12432,7 @@
               <a:t>LANGUAGE TRANSLATION WITH NN.TRANSFORMER AND TORCHTEXT</a:t>
             </a:r>
             <a:r>
-              <a:rPr lang="en-US" sz="2000" dirty="0">
+              <a:rPr lang="en-US" sz="2000">
                 <a:solidFill>
                   <a:srgbClr val="041F41"/>
                 </a:solidFill>
@@ -12541,7 +12552,7 @@
           <a:lstStyle/>
           <a:p>
             <a:r>
-              <a:rPr lang="en-US" sz="6600" dirty="0">
+              <a:rPr lang="en-US" sz="6600">
                 <a:solidFill>
                   <a:schemeClr val="bg1"/>
                 </a:solidFill>
@@ -12651,7 +12662,7 @@
           <a:lstStyle/>
           <a:p>
             <a:r>
-              <a:rPr lang="en-US" dirty="0">
+              <a:rPr lang="en-US">
                 <a:solidFill>
                   <a:srgbClr val="041F41"/>
                 </a:solidFill>
@@ -12684,7 +12695,7 @@
           </a:xfrm>
         </p:spPr>
         <p:txBody>
-          <a:bodyPr>
+          <a:bodyPr vert="horz" lIns="91440" tIns="45720" rIns="91440" bIns="45720" rtlCol="0" anchor="t">
             <a:normAutofit/>
           </a:bodyPr>
           <a:lstStyle/>
@@ -12710,22 +12721,20 @@
           </a:p>
           <a:p>
             <a:r>
+              <a:rPr lang="en-US" sz="2000">
+                <a:solidFill>
+                  <a:srgbClr val="041F41"/>
+                </a:solidFill>
+              </a:rPr>
+              <a:t>Transformers </a:t>
+            </a:r>
+            <a:r>
               <a:rPr lang="en-US" sz="2000" dirty="0">
                 <a:solidFill>
                   <a:srgbClr val="041F41"/>
                 </a:solidFill>
               </a:rPr>
-              <a:t>We admire the author Ashish Vaswani and his work.</a:t>
-            </a:r>
-          </a:p>
-          <a:p>
-            <a:r>
-              <a:rPr lang="en-US" sz="2000" dirty="0">
-                <a:solidFill>
-                  <a:srgbClr val="041F41"/>
-                </a:solidFill>
-              </a:rPr>
-              <a:t>Transformers were developed to solve the problem machine translation and sequence transduction, or neural machine translation... but they do so much more! </a:t>
+              <a:t>were developed to solve the problem machine translation and sequence transduction, or neural machine translation... but they do so much more! </a:t>
             </a:r>
           </a:p>
           <a:p>
@@ -12768,10 +12777,26 @@
                 <a:solidFill>
                   <a:srgbClr val="041F41"/>
                 </a:solidFill>
+              </a:rPr>
+              <a:t> et al.,</a:t>
+            </a:r>
+            <a:r>
+              <a:rPr lang="en-US" sz="2000" dirty="0">
+                <a:solidFill>
+                  <a:srgbClr val="041F41"/>
+                </a:solidFill>
                 <a:effectLst/>
               </a:rPr>
-              <a:t>, 2020)</a:t>
-            </a:r>
+              <a:t> 2020)</a:t>
+            </a:r>
+            <a:endParaRPr lang="en-US" sz="2000" dirty="0">
+              <a:solidFill>
+                <a:srgbClr val="041F41"/>
+              </a:solidFill>
+              <a:effectLst/>
+              <a:ea typeface="Calibri"/>
+              <a:cs typeface="Calibri"/>
+            </a:endParaRPr>
           </a:p>
           <a:p>
             <a:pPr lvl="1"/>
@@ -12812,11 +12837,16 @@
                 </a:solidFill>
                 <a:effectLst/>
               </a:rPr>
-              <a:t>Semantic Segmentation (ex: FD-SwinV2-G Transformer) </a:t>
-            </a:r>
-          </a:p>
-          <a:p>
-            <a:pPr lvl="1"/>
+              <a:t>Semantic Segmentation (</a:t>
+            </a:r>
+            <a:r>
+              <a:rPr lang="en-US" sz="2000" dirty="0">
+                <a:solidFill>
+                  <a:srgbClr val="041F41"/>
+                </a:solidFill>
+              </a:rPr>
+              <a:t>e.g.:</a:t>
+            </a:r>
             <a:r>
               <a:rPr lang="en-US" sz="2000" dirty="0">
                 <a:solidFill>
@@ -12824,8 +12854,67 @@
                 </a:solidFill>
                 <a:effectLst/>
               </a:rPr>
-              <a:t>Object Detection (ex: FD-SwinV2-G Transformer) </a:t>
-            </a:r>
+              <a:t> FD-SwinV2-G Transformer)</a:t>
+            </a:r>
+            <a:r>
+              <a:rPr lang="en-US" sz="2000" dirty="0">
+                <a:solidFill>
+                  <a:srgbClr val="041F41"/>
+                </a:solidFill>
+              </a:rPr>
+              <a:t> </a:t>
+            </a:r>
+            <a:endParaRPr lang="en-US" sz="2000" dirty="0">
+              <a:solidFill>
+                <a:srgbClr val="041F41"/>
+              </a:solidFill>
+              <a:effectLst/>
+              <a:cs typeface="Calibri"/>
+            </a:endParaRPr>
+          </a:p>
+          <a:p>
+            <a:pPr lvl="1"/>
+            <a:r>
+              <a:rPr lang="en-US" sz="2000" dirty="0">
+                <a:solidFill>
+                  <a:srgbClr val="041F41"/>
+                </a:solidFill>
+                <a:effectLst/>
+              </a:rPr>
+              <a:t>Object Detection (</a:t>
+            </a:r>
+            <a:r>
+              <a:rPr lang="en-US" sz="2000" dirty="0">
+                <a:solidFill>
+                  <a:srgbClr val="041F41"/>
+                </a:solidFill>
+              </a:rPr>
+              <a:t>e.g.:</a:t>
+            </a:r>
+            <a:r>
+              <a:rPr lang="en-US" sz="2000" dirty="0">
+                <a:solidFill>
+                  <a:srgbClr val="041F41"/>
+                </a:solidFill>
+                <a:effectLst/>
+              </a:rPr>
+              <a:t> FD-SwinV2-G Transformer)</a:t>
+            </a:r>
+            <a:r>
+              <a:rPr lang="en-US" sz="2000" dirty="0">
+                <a:solidFill>
+                  <a:srgbClr val="041F41"/>
+                </a:solidFill>
+              </a:rPr>
+              <a:t> </a:t>
+            </a:r>
+            <a:endParaRPr lang="en-US" sz="2000" dirty="0">
+              <a:solidFill>
+                <a:srgbClr val="041F41"/>
+              </a:solidFill>
+              <a:effectLst/>
+              <a:cs typeface="Calibri" panose="020F0502020204030204"/>
+            </a:endParaRPr>
           </a:p>
         </p:txBody>
       </p:sp>
@@ -12929,7 +13018,7 @@
           <a:lstStyle/>
           <a:p>
             <a:r>
-              <a:rPr lang="en-US" dirty="0">
+              <a:rPr lang="en-US">
                 <a:solidFill>
                   <a:srgbClr val="041F41"/>
                 </a:solidFill>
@@ -12962,13 +13051,13 @@
           </a:xfrm>
         </p:spPr>
         <p:txBody>
-          <a:bodyPr>
+          <a:bodyPr vert="horz" lIns="91440" tIns="45720" rIns="91440" bIns="45720" rtlCol="0" anchor="t">
             <a:normAutofit/>
           </a:bodyPr>
           <a:lstStyle/>
           <a:p>
             <a:r>
-              <a:rPr lang="en-US" sz="2000" dirty="0">
+              <a:rPr lang="en-US" sz="2000">
                 <a:solidFill>
                   <a:srgbClr val="041F41"/>
                 </a:solidFill>
@@ -12978,7 +13067,7 @@
           </a:p>
           <a:p>
             <a:r>
-              <a:rPr lang="en-US" sz="2000" dirty="0">
+              <a:rPr lang="en-US" sz="2000">
                 <a:solidFill>
                   <a:srgbClr val="041F41"/>
                 </a:solidFill>
@@ -12988,15 +13077,15 @@
           </a:p>
           <a:p>
             <a:r>
-              <a:rPr lang="en-US" sz="2000" dirty="0">
+              <a:rPr lang="en-US" sz="2000">
                 <a:solidFill>
                   <a:srgbClr val="041F41"/>
                 </a:solidFill>
               </a:rPr>
-              <a:t>Even the original paper** and official implementation</a:t>
-            </a:r>
-            <a:r>
-              <a:rPr lang="en-US" sz="2000" baseline="30000" dirty="0">
+              <a:t>The original paper** and official implementation</a:t>
+            </a:r>
+            <a:r>
+              <a:rPr lang="en-US" sz="2000" baseline="30000">
                 <a:solidFill>
                   <a:srgbClr val="041F41"/>
                 </a:solidFill>
@@ -13004,12 +13093,12 @@
               <a:t>#</a:t>
             </a:r>
             <a:r>
-              <a:rPr lang="en-US" sz="2000" dirty="0">
+              <a:rPr lang="en-US" sz="2000">
                 <a:solidFill>
                   <a:srgbClr val="041F41"/>
                 </a:solidFill>
               </a:rPr>
-              <a:t> make a small change in implementation however they still aren’t able to converge significantly.</a:t>
+              <a:t> make a small change in implementation paper however they still aren’t able to converge significantly.</a:t>
             </a:r>
           </a:p>
         </p:txBody>
@@ -13086,7 +13175,7 @@
           <a:lstStyle/>
           <a:p>
             <a:r>
-              <a:rPr lang="en-US" sz="1600" dirty="0">
+              <a:rPr lang="en-US" sz="1600">
                 <a:solidFill>
                   <a:srgbClr val="041F41"/>
                 </a:solidFill>
@@ -13094,7 +13183,7 @@
               <a:t>**</a:t>
             </a:r>
             <a:r>
-              <a:rPr lang="en-US" sz="1600" dirty="0">
+              <a:rPr lang="en-US" sz="1600">
                 <a:solidFill>
                   <a:srgbClr val="041F41"/>
                 </a:solidFill>
@@ -13102,7 +13191,7 @@
               </a:rPr>
               <a:t>Vaswani et al., 2017</a:t>
             </a:r>
-            <a:endParaRPr lang="en-US" sz="1600" dirty="0">
+            <a:endParaRPr lang="en-US" sz="1600">
               <a:solidFill>
                 <a:srgbClr val="041F41"/>
               </a:solidFill>
@@ -13110,7 +13199,7 @@
           </a:p>
           <a:p>
             <a:r>
-              <a:rPr lang="en-US" sz="1600" baseline="30000" dirty="0">
+              <a:rPr lang="en-US" sz="1600" baseline="30000">
                 <a:solidFill>
                   <a:srgbClr val="041F41"/>
                 </a:solidFill>
@@ -13118,7 +13207,7 @@
               <a:t>     #</a:t>
             </a:r>
             <a:r>
-              <a:rPr lang="en-US" sz="1600" dirty="0">
+              <a:rPr lang="en-US" sz="1600">
                 <a:solidFill>
                   <a:srgbClr val="041F41"/>
                 </a:solidFill>
@@ -13126,7 +13215,7 @@
               </a:rPr>
               <a:t>Vaswani et al., 2018</a:t>
             </a:r>
-            <a:endParaRPr lang="en-US" sz="1600" dirty="0">
+            <a:endParaRPr lang="en-US" sz="1600">
               <a:solidFill>
                 <a:srgbClr val="041F41"/>
               </a:solidFill>
@@ -13191,7 +13280,7 @@
           <a:lstStyle/>
           <a:p>
             <a:r>
-              <a:rPr lang="en-US" dirty="0">
+              <a:rPr lang="en-US">
                 <a:solidFill>
                   <a:srgbClr val="041F41"/>
                 </a:solidFill>
@@ -13303,7 +13392,7 @@
           <a:lstStyle/>
           <a:p>
             <a:r>
-              <a:rPr lang="en-US" sz="2000" dirty="0">
+              <a:rPr lang="en-US" sz="2000">
                 <a:solidFill>
                   <a:srgbClr val="041F41"/>
                 </a:solidFill>
@@ -13342,7 +13431,7 @@
           <a:lstStyle/>
           <a:p>
             <a:r>
-              <a:rPr lang="en-US" sz="1600" dirty="0">
+              <a:rPr lang="en-US" sz="1600">
                 <a:solidFill>
                   <a:srgbClr val="041F41"/>
                 </a:solidFill>
@@ -13350,7 +13439,7 @@
               <a:t>Source: </a:t>
             </a:r>
             <a:r>
-              <a:rPr lang="en-US" sz="1600" dirty="0">
+              <a:rPr lang="en-US" sz="1600">
                 <a:solidFill>
                   <a:srgbClr val="041F41"/>
                 </a:solidFill>
@@ -13358,7 +13447,7 @@
               </a:rPr>
               <a:t>Hongfei Xu et al., 2020</a:t>
             </a:r>
-            <a:endParaRPr lang="en-US" sz="1600" dirty="0">
+            <a:endParaRPr lang="en-US" sz="1600">
               <a:solidFill>
                 <a:srgbClr val="041F41"/>
               </a:solidFill>
@@ -13423,7 +13512,7 @@
           <a:lstStyle/>
           <a:p>
             <a:r>
-              <a:rPr lang="en-US" dirty="0">
+              <a:rPr lang="en-US">
                 <a:solidFill>
                   <a:srgbClr val="041F41"/>
                 </a:solidFill>
@@ -13465,7 +13554,7 @@
               <a:buNone/>
             </a:pPr>
             <a:r>
-              <a:rPr lang="en-US" sz="2000" dirty="0">
+              <a:rPr lang="en-US" sz="2000">
                 <a:solidFill>
                   <a:srgbClr val="041F41"/>
                 </a:solidFill>
@@ -13475,7 +13564,7 @@
           </a:p>
           <a:p>
             <a:r>
-              <a:rPr lang="en-US" sz="2000" dirty="0">
+              <a:rPr lang="en-US" sz="2000">
                 <a:solidFill>
                   <a:srgbClr val="041F41"/>
                 </a:solidFill>
@@ -13485,7 +13574,7 @@
           </a:p>
           <a:p>
             <a:r>
-              <a:rPr lang="en-US" sz="2000" dirty="0">
+              <a:rPr lang="en-US" sz="2000">
                 <a:solidFill>
                   <a:srgbClr val="041F41"/>
                 </a:solidFill>
@@ -13495,7 +13584,7 @@
           </a:p>
           <a:p>
             <a:r>
-              <a:rPr lang="en-US" sz="2000" dirty="0">
+              <a:rPr lang="en-US" sz="2000">
                 <a:solidFill>
                   <a:srgbClr val="041F41"/>
                 </a:solidFill>
@@ -13506,7 +13595,7 @@
           <a:p>
             <a:pPr lvl="1"/>
             <a:r>
-              <a:rPr lang="en-US" sz="2000" dirty="0">
+              <a:rPr lang="en-US" sz="2000">
                 <a:solidFill>
                   <a:srgbClr val="041F41"/>
                 </a:solidFill>
@@ -13575,7 +13664,7 @@
         <p:spPr>
           <a:xfrm>
             <a:off x="4214648" y="3636579"/>
-            <a:ext cx="6090322" cy="1631216"/>
+            <a:ext cx="5758499" cy="1631216"/>
           </a:xfrm>
           <a:prstGeom prst="rect">
             <a:avLst/>
@@ -13583,13 +13672,13 @@
           <a:noFill/>
         </p:spPr>
         <p:txBody>
-          <a:bodyPr wrap="none" rtlCol="0">
+          <a:bodyPr wrap="none" lIns="91440" tIns="45720" rIns="91440" bIns="45720" rtlCol="0" anchor="t">
             <a:spAutoFit/>
           </a:bodyPr>
           <a:lstStyle/>
           <a:p>
             <a:r>
-              <a:rPr lang="en-US" sz="2000" dirty="0">
+              <a:rPr lang="en-US" sz="2000">
                 <a:solidFill>
                   <a:srgbClr val="041F41"/>
                 </a:solidFill>
@@ -13599,20 +13688,26 @@
           </a:p>
           <a:p>
             <a:r>
-              <a:rPr lang="en-US" sz="2000" dirty="0">
+              <a:rPr lang="en-US" sz="2000">
                 <a:solidFill>
                   <a:srgbClr val="041F41"/>
                 </a:solidFill>
               </a:rPr>
-              <a:t>How would a RNN, LSTM, and GRU fill in the word mask?</a:t>
-            </a:r>
+              <a:t>How would a RNN, LSTM, and GRU do word masking?</a:t>
+            </a:r>
+            <a:endParaRPr lang="en-US" sz="2000">
+              <a:solidFill>
+                <a:srgbClr val="041F41"/>
+              </a:solidFill>
+              <a:cs typeface="Calibri"/>
+            </a:endParaRPr>
           </a:p>
           <a:p>
             <a:pPr marL="342900" indent="-342900">
               <a:buAutoNum type="arabicPeriod"/>
             </a:pPr>
             <a:r>
-              <a:rPr lang="en-US" sz="2000" dirty="0">
+              <a:rPr lang="en-US" sz="2000">
                 <a:solidFill>
                   <a:srgbClr val="041F41"/>
                 </a:solidFill>
@@ -13625,7 +13720,7 @@
               <a:buAutoNum type="arabicPeriod"/>
             </a:pPr>
             <a:r>
-              <a:rPr lang="en-US" sz="2000" dirty="0">
+              <a:rPr lang="en-US" sz="2000">
                 <a:solidFill>
                   <a:srgbClr val="041F41"/>
                 </a:solidFill>
@@ -13638,7 +13733,7 @@
               <a:buAutoNum type="arabicPeriod"/>
             </a:pPr>
             <a:r>
-              <a:rPr lang="en-US" sz="2000" dirty="0">
+              <a:rPr lang="en-US" sz="2000">
                 <a:solidFill>
                   <a:srgbClr val="041F41"/>
                 </a:solidFill>
@@ -13677,7 +13772,7 @@
           <a:lstStyle/>
           <a:p>
             <a:r>
-              <a:rPr lang="en-US" sz="2000" dirty="0">
+              <a:rPr lang="en-US" sz="2000">
                 <a:solidFill>
                   <a:srgbClr val="041F41"/>
                 </a:solidFill>
@@ -13868,7 +13963,7 @@
           <a:lstStyle/>
           <a:p>
             <a:r>
-              <a:rPr lang="en-US" dirty="0">
+              <a:rPr lang="en-US">
                 <a:solidFill>
                   <a:srgbClr val="041F41"/>
                 </a:solidFill>
@@ -13907,7 +14002,7 @@
           <a:lstStyle/>
           <a:p>
             <a:r>
-              <a:rPr lang="en-US" sz="2000" dirty="0">
+              <a:rPr lang="en-US" sz="2000">
                 <a:solidFill>
                   <a:srgbClr val="041F41"/>
                 </a:solidFill>
@@ -13921,7 +14016,7 @@
               <a:buChar char="•"/>
             </a:pPr>
             <a:r>
-              <a:rPr lang="en-US" sz="2000" dirty="0">
+              <a:rPr lang="en-US" sz="2000">
                 <a:solidFill>
                   <a:srgbClr val="041F41"/>
                 </a:solidFill>
@@ -13929,7 +14024,7 @@
               </a:rPr>
               <a:t>Each element becomes query, key, and value from the input embeddings by multiplying by a weight matrix.</a:t>
             </a:r>
-            <a:endParaRPr lang="en-US" sz="2000" dirty="0">
+            <a:endParaRPr lang="en-US" sz="2000">
               <a:solidFill>
                 <a:srgbClr val="041F41"/>
               </a:solidFill>
@@ -14206,7 +14301,7 @@
               <a:buNone/>
             </a:pPr>
             <a:r>
-              <a:rPr lang="en-US" sz="2400" dirty="0">
+              <a:rPr lang="en-US" sz="2400">
                 <a:solidFill>
                   <a:srgbClr val="041F41"/>
                 </a:solidFill>
@@ -14220,7 +14315,7 @@
               <a:buNone/>
             </a:pPr>
             <a:r>
-              <a:rPr lang="en-US" sz="2000" dirty="0">
+              <a:rPr lang="en-US" sz="2000">
                 <a:solidFill>
                   <a:srgbClr val="041F41"/>
                 </a:solidFill>
@@ -14234,7 +14329,7 @@
               <a:buAutoNum type="arabicPeriod"/>
             </a:pPr>
             <a:r>
-              <a:rPr lang="en-US" sz="2000" dirty="0">
+              <a:rPr lang="en-US" sz="2000">
                 <a:solidFill>
                   <a:srgbClr val="041F41"/>
                 </a:solidFill>
@@ -14248,7 +14343,7 @@
               <a:buAutoNum type="arabicPeriod"/>
             </a:pPr>
             <a:r>
-              <a:rPr lang="en-US" sz="2000" dirty="0">
+              <a:rPr lang="en-US" sz="2000">
                 <a:solidFill>
                   <a:srgbClr val="041F41"/>
                 </a:solidFill>
@@ -14263,7 +14358,7 @@
               <a:buAutoNum type="arabicPeriod"/>
             </a:pPr>
             <a:r>
-              <a:rPr lang="en-US" sz="2000" dirty="0">
+              <a:rPr lang="en-US" sz="2000">
                 <a:solidFill>
                   <a:srgbClr val="041F41"/>
                 </a:solidFill>
@@ -14275,7 +14370,7 @@
             <a:pPr marL="0" indent="0">
               <a:buNone/>
             </a:pPr>
-            <a:endParaRPr lang="en-US" sz="2000" dirty="0">
+            <a:endParaRPr lang="en-US" sz="2000">
               <a:solidFill>
                 <a:srgbClr val="041F41"/>
               </a:solidFill>
@@ -14338,7 +14433,7 @@
                     <a:lstStyle/>
                     <a:p>
                       <a:r>
-                        <a:rPr lang="en-US" dirty="0">
+                        <a:rPr lang="en-US">
                           <a:solidFill>
                             <a:schemeClr val="bg1"/>
                           </a:solidFill>
@@ -14359,7 +14454,7 @@
                     <a:lstStyle/>
                     <a:p>
                       <a:r>
-                        <a:rPr lang="en-US" dirty="0">
+                        <a:rPr lang="en-US">
                           <a:solidFill>
                             <a:schemeClr val="bg1"/>
                           </a:solidFill>
@@ -14387,7 +14482,7 @@
                     <a:lstStyle/>
                     <a:p>
                       <a:r>
-                        <a:rPr lang="en-US" dirty="0">
+                        <a:rPr lang="en-US">
                           <a:solidFill>
                             <a:srgbClr val="041F41"/>
                           </a:solidFill>
@@ -14406,7 +14501,7 @@
                     <a:lstStyle/>
                     <a:p>
                       <a:r>
-                        <a:rPr lang="en-US" dirty="0">
+                        <a:rPr lang="en-US">
                           <a:solidFill>
                             <a:srgbClr val="041F41"/>
                           </a:solidFill>
@@ -14432,7 +14527,7 @@
                     <a:lstStyle/>
                     <a:p>
                       <a:r>
-                        <a:rPr lang="en-US" dirty="0">
+                        <a:rPr lang="en-US">
                           <a:solidFill>
                             <a:srgbClr val="041F41"/>
                           </a:solidFill>
@@ -14451,7 +14546,7 @@
                     <a:lstStyle/>
                     <a:p>
                       <a:r>
-                        <a:rPr lang="en-US" dirty="0">
+                        <a:rPr lang="en-US">
                           <a:solidFill>
                             <a:srgbClr val="041F41"/>
                           </a:solidFill>
@@ -14477,7 +14572,7 @@
                     <a:lstStyle/>
                     <a:p>
                       <a:r>
-                        <a:rPr lang="en-US" dirty="0">
+                        <a:rPr lang="en-US">
                           <a:solidFill>
                             <a:srgbClr val="041F41"/>
                           </a:solidFill>
@@ -14496,7 +14591,7 @@
                     <a:lstStyle/>
                     <a:p>
                       <a:r>
-                        <a:rPr lang="en-US" dirty="0">
+                        <a:rPr lang="en-US">
                           <a:solidFill>
                             <a:srgbClr val="041F41"/>
                           </a:solidFill>
@@ -14548,7 +14643,7 @@
           <a:lstStyle/>
           <a:p>
             <a:r>
-              <a:rPr lang="en-US" sz="1600" dirty="0">
+              <a:rPr lang="en-US" sz="1600">
                 <a:solidFill>
                   <a:srgbClr val="041F41"/>
                 </a:solidFill>
@@ -14556,7 +14651,7 @@
               <a:t>Source: </a:t>
             </a:r>
             <a:r>
-              <a:rPr lang="en-US" sz="1600" dirty="0">
+              <a:rPr lang="en-US" sz="1600">
                 <a:solidFill>
                   <a:srgbClr val="041F41"/>
                 </a:solidFill>
@@ -14564,7 +14659,7 @@
               </a:rPr>
               <a:t>Google Blog</a:t>
             </a:r>
-            <a:endParaRPr lang="en-US" sz="1600" dirty="0">
+            <a:endParaRPr lang="en-US" sz="1600">
               <a:solidFill>
                 <a:srgbClr val="041F41"/>
               </a:solidFill>
@@ -14601,7 +14696,7 @@
           <a:lstStyle/>
           <a:p>
             <a:r>
-              <a:rPr lang="en-US" sz="800" dirty="0">
+              <a:rPr lang="en-US" sz="800">
                 <a:solidFill>
                   <a:srgbClr val="041F41"/>
                 </a:solidFill>
@@ -14612,7 +14707,7 @@
           </a:p>
           <a:p>
             <a:r>
-              <a:rPr lang="en-US" sz="800" dirty="0">
+              <a:rPr lang="en-US" sz="800">
                 <a:solidFill>
                   <a:srgbClr val="041F41"/>
                 </a:solidFill>
@@ -14623,7 +14718,7 @@
           </a:p>
           <a:p>
             <a:r>
-              <a:rPr lang="en-US" sz="800" dirty="0">
+              <a:rPr lang="en-US" sz="800">
                 <a:solidFill>
                   <a:srgbClr val="041F41"/>
                 </a:solidFill>
@@ -14634,7 +14729,7 @@
           </a:p>
           <a:p>
             <a:r>
-              <a:rPr lang="en-US" sz="800" dirty="0">
+              <a:rPr lang="en-US" sz="800">
                 <a:solidFill>
                   <a:srgbClr val="041F41"/>
                 </a:solidFill>
@@ -14835,7 +14930,7 @@
           <a:lstStyle/>
           <a:p>
             <a:r>
-              <a:rPr lang="en-US" dirty="0">
+              <a:rPr lang="en-US">
                 <a:solidFill>
                   <a:srgbClr val="041F41"/>
                 </a:solidFill>
@@ -14874,7 +14969,7 @@
           <a:lstStyle/>
           <a:p>
             <a:r>
-              <a:rPr lang="en-US" sz="2000" dirty="0">
+              <a:rPr lang="en-US" sz="2000">
                 <a:solidFill>
                   <a:srgbClr val="041F41"/>
                 </a:solidFill>
@@ -14888,7 +14983,7 @@
               <a:buAutoNum type="arabicPeriod"/>
             </a:pPr>
             <a:r>
-              <a:rPr lang="en-US" sz="2000" dirty="0">
+              <a:rPr lang="en-US" sz="2000">
                 <a:solidFill>
                   <a:srgbClr val="041F41"/>
                 </a:solidFill>
@@ -14903,7 +14998,7 @@
               <a:buAutoNum type="arabicPeriod"/>
             </a:pPr>
             <a:r>
-              <a:rPr lang="en-US" sz="2000" dirty="0">
+              <a:rPr lang="en-US" sz="2000">
                 <a:solidFill>
                   <a:srgbClr val="041F41"/>
                 </a:solidFill>
@@ -14911,7 +15006,7 @@
               </a:rPr>
               <a:t>Concatenate output of attention heads to form (plus non-linearity) output layer.</a:t>
             </a:r>
-            <a:endParaRPr lang="en-US" sz="2000" dirty="0">
+            <a:endParaRPr lang="en-US" sz="2000">
               <a:solidFill>
                 <a:srgbClr val="041F41"/>
               </a:solidFill>
@@ -14919,7 +15014,7 @@
           </a:p>
           <a:p>
             <a:r>
-              <a:rPr lang="en-US" sz="2000" dirty="0">
+              <a:rPr lang="en-US" sz="2000">
                 <a:solidFill>
                   <a:srgbClr val="041F41"/>
                 </a:solidFill>
@@ -14933,7 +15028,7 @@
               <a:buAutoNum type="arabicPeriod"/>
             </a:pPr>
             <a:r>
-              <a:rPr lang="en-US" sz="2000" dirty="0">
+              <a:rPr lang="en-US" sz="2000">
                 <a:solidFill>
                   <a:srgbClr val="041F41"/>
                 </a:solidFill>
@@ -14948,7 +15043,7 @@
               <a:buAutoNum type="arabicPeriod"/>
             </a:pPr>
             <a:r>
-              <a:rPr lang="en-US" sz="2000" dirty="0">
+              <a:rPr lang="en-US" sz="2000">
                 <a:solidFill>
                   <a:srgbClr val="041F41"/>
                 </a:solidFill>
@@ -14963,7 +15058,7 @@
               <a:buAutoNum type="arabicPeriod"/>
             </a:pPr>
             <a:r>
-              <a:rPr lang="en-US" sz="2000" dirty="0">
+              <a:rPr lang="en-US" sz="2000">
                 <a:solidFill>
                   <a:srgbClr val="041F41"/>
                 </a:solidFill>
@@ -14991,7 +15086,7 @@
               <a:defRPr/>
             </a:pPr>
             <a:r>
-              <a:rPr kumimoji="0" lang="en-US" sz="2000" b="0" i="0" u="none" strike="noStrike" kern="1200" cap="none" spc="0" normalizeH="0" baseline="0" noProof="0" dirty="0">
+              <a:rPr kumimoji="0" lang="en-US" sz="2000" b="0" i="0" u="none" strike="noStrike" kern="1200" cap="none" spc="0" normalizeH="0" baseline="0" noProof="0">
                 <a:ln>
                   <a:noFill/>
                 </a:ln>
@@ -15013,7 +15108,7 @@
               <a:buAutoNum type="arabicPeriod"/>
             </a:pPr>
             <a:r>
-              <a:rPr lang="en-US" sz="2000" dirty="0">
+              <a:rPr lang="en-US" sz="2000">
                 <a:solidFill>
                   <a:srgbClr val="041F41"/>
                 </a:solidFill>
@@ -15028,14 +15123,14 @@
               <a:buAutoNum type="arabicPeriod"/>
             </a:pPr>
             <a:r>
-              <a:rPr lang="en-US" sz="2000" dirty="0">
+              <a:rPr lang="en-US" sz="2000">
                 <a:solidFill>
                   <a:srgbClr val="041F41"/>
                 </a:solidFill>
               </a:rPr>
               <a:t>Attention heads are independent of each other.</a:t>
             </a:r>
-            <a:endParaRPr lang="en-US" sz="2000" dirty="0">
+            <a:endParaRPr lang="en-US" sz="2000">
               <a:solidFill>
                 <a:srgbClr val="041F41"/>
               </a:solidFill>
@@ -15146,7 +15241,7 @@
           <a:lstStyle/>
           <a:p>
             <a:r>
-              <a:rPr lang="en-US" sz="1600" dirty="0">
+              <a:rPr lang="en-US" sz="1600">
                 <a:solidFill>
                   <a:srgbClr val="041F41"/>
                 </a:solidFill>
@@ -15154,7 +15249,7 @@
               <a:t>Source: </a:t>
             </a:r>
             <a:r>
-              <a:rPr lang="en-US" sz="1600" dirty="0">
+              <a:rPr lang="en-US" sz="1600">
                 <a:solidFill>
                   <a:srgbClr val="041F41"/>
                 </a:solidFill>
@@ -15162,7 +15257,7 @@
               </a:rPr>
               <a:t>Attention Is All You Need</a:t>
             </a:r>
-            <a:endParaRPr lang="en-US" sz="1600" dirty="0">
+            <a:endParaRPr lang="en-US" sz="1600">
               <a:solidFill>
                 <a:srgbClr val="041F41"/>
               </a:solidFill>
@@ -15227,7 +15322,7 @@
           <a:lstStyle/>
           <a:p>
             <a:r>
-              <a:rPr lang="en-US" dirty="0">
+              <a:rPr lang="en-US">
                 <a:solidFill>
                   <a:srgbClr val="041F41"/>
                 </a:solidFill>
@@ -15270,7 +15365,7 @@
               <a:buChar char="•"/>
             </a:pPr>
             <a:r>
-              <a:rPr lang="en-US" sz="2000" dirty="0">
+              <a:rPr lang="en-US" sz="2000">
                 <a:solidFill>
                   <a:srgbClr val="041F41"/>
                 </a:solidFill>
@@ -15285,7 +15380,7 @@
               <a:buChar char="•"/>
             </a:pPr>
             <a:r>
-              <a:rPr lang="en-US" sz="2000" dirty="0">
+              <a:rPr lang="en-US" sz="2000">
                 <a:solidFill>
                   <a:srgbClr val="041F41"/>
                 </a:solidFill>
@@ -15297,7 +15392,7 @@
           <a:p>
             <a:pPr lvl="1"/>
             <a:r>
-              <a:rPr lang="en-US" sz="2000" dirty="0">
+              <a:rPr lang="en-US" sz="2000">
                 <a:solidFill>
                   <a:srgbClr val="041F41"/>
                 </a:solidFill>
@@ -15305,7 +15400,7 @@
               </a:rPr>
               <a:t>Element wise addition the position embedding to the word embedding vector.</a:t>
             </a:r>
-            <a:endParaRPr lang="en-US" sz="2000" dirty="0">
+            <a:endParaRPr lang="en-US" sz="2000">
               <a:solidFill>
                 <a:srgbClr val="041F41"/>
               </a:solidFill>
@@ -15314,7 +15409,7 @@
           <a:p>
             <a:pPr lvl="1"/>
             <a:r>
-              <a:rPr lang="en-US" sz="2000" dirty="0">
+              <a:rPr lang="en-US" sz="2000">
                 <a:solidFill>
                   <a:srgbClr val="041F41"/>
                 </a:solidFill>
@@ -15325,7 +15420,7 @@
           </a:p>
           <a:p>
             <a:pPr lvl="1"/>
-            <a:endParaRPr lang="en-US" sz="2000" dirty="0">
+            <a:endParaRPr lang="en-US" sz="2000">
               <a:solidFill>
                 <a:srgbClr val="041F41"/>
               </a:solidFill>
@@ -15335,7 +15430,7 @@
             <a:pPr marL="457200" lvl="1" indent="0">
               <a:buNone/>
             </a:pPr>
-            <a:endParaRPr lang="en-US" sz="2000" dirty="0">
+            <a:endParaRPr lang="en-US" sz="2000">
               <a:solidFill>
                 <a:srgbClr val="041F41"/>
               </a:solidFill>
@@ -15346,7 +15441,7 @@
               <a:buNone/>
             </a:pPr>
             <a:r>
-              <a:rPr lang="en-US" sz="2000" dirty="0">
+              <a:rPr lang="en-US" sz="2000">
                 <a:solidFill>
                   <a:srgbClr val="041F41"/>
                 </a:solidFill>
@@ -15354,7 +15449,7 @@
               <a:t>From paper: “We chose this function because we hypothesized it would allow the model to easily learn to attend by relative positions, since for any fixed offset k, </a:t>
             </a:r>
             <a:r>
-              <a:rPr lang="en-US" sz="2000" dirty="0" err="1">
+              <a:rPr lang="en-US" sz="2000" err="1">
                 <a:solidFill>
                   <a:srgbClr val="041F41"/>
                 </a:solidFill>
@@ -15362,7 +15457,7 @@
               <a:t>PE</a:t>
             </a:r>
             <a:r>
-              <a:rPr lang="en-US" sz="2000" baseline="-25000" dirty="0" err="1">
+              <a:rPr lang="en-US" sz="2000" baseline="-25000" err="1">
                 <a:solidFill>
                   <a:srgbClr val="041F41"/>
                 </a:solidFill>
@@ -15370,7 +15465,7 @@
               <a:t>pos+k</a:t>
             </a:r>
             <a:r>
-              <a:rPr lang="en-US" sz="2000" baseline="-25000" dirty="0">
+              <a:rPr lang="en-US" sz="2000" baseline="-25000">
                 <a:solidFill>
                   <a:srgbClr val="041F41"/>
                 </a:solidFill>
@@ -15378,7 +15473,7 @@
               <a:t>  </a:t>
             </a:r>
             <a:r>
-              <a:rPr lang="en-US" sz="2000" dirty="0">
+              <a:rPr lang="en-US" sz="2000">
                 <a:solidFill>
                   <a:srgbClr val="041F41"/>
                 </a:solidFill>
@@ -15386,7 +15481,7 @@
               <a:t>can be represented as a linear function of </a:t>
             </a:r>
             <a:r>
-              <a:rPr lang="en-US" sz="2000" dirty="0" err="1">
+              <a:rPr lang="en-US" sz="2000" err="1">
                 <a:solidFill>
                   <a:srgbClr val="041F41"/>
                 </a:solidFill>
@@ -15394,7 +15489,7 @@
               <a:t>PE</a:t>
             </a:r>
             <a:r>
-              <a:rPr lang="en-US" sz="2000" baseline="-25000" dirty="0" err="1">
+              <a:rPr lang="en-US" sz="2000" baseline="-25000" err="1">
                 <a:solidFill>
                   <a:srgbClr val="041F41"/>
                 </a:solidFill>
@@ -15402,7 +15497,7 @@
               <a:t>pos</a:t>
             </a:r>
             <a:r>
-              <a:rPr lang="en-US" sz="2000" dirty="0">
+              <a:rPr lang="en-US" sz="2000">
                 <a:solidFill>
                   <a:srgbClr val="041F41"/>
                 </a:solidFill>
@@ -15591,7 +15686,7 @@
           <a:lstStyle/>
           <a:p>
             <a:r>
-              <a:rPr lang="en-US" dirty="0">
+              <a:rPr lang="en-US">
                 <a:solidFill>
                   <a:srgbClr val="041F41"/>
                 </a:solidFill>
@@ -16189,7 +16284,7 @@
           <a:p>
             <a:pPr algn="ctr"/>
             <a:r>
-              <a:rPr lang="en-US" sz="1600" dirty="0">
+              <a:rPr lang="en-US" sz="1600">
                 <a:solidFill>
                   <a:schemeClr val="accent6">
                     <a:lumMod val="75000"/>
@@ -16200,7 +16295,7 @@
               <a:t>Encoder</a:t>
             </a:r>
             <a:r>
-              <a:rPr lang="en-US" sz="1600" dirty="0">
+              <a:rPr lang="en-US" sz="1600">
                 <a:latin typeface="+mj-lt"/>
               </a:rPr>
               <a:t> self-attention:</a:t>
@@ -16209,7 +16304,7 @@
           <a:p>
             <a:pPr algn="ctr"/>
             <a:r>
-              <a:rPr lang="en-US" sz="1400" dirty="0">
+              <a:rPr lang="en-US" sz="1400">
                 <a:latin typeface="+mj-lt"/>
               </a:rPr>
               <a:t>tokens look at each other</a:t>
@@ -16218,7 +16313,7 @@
           <a:p>
             <a:pPr algn="ctr"/>
             <a:r>
-              <a:rPr lang="en-US" sz="1200" dirty="0">
+              <a:rPr lang="en-US" sz="1200">
                 <a:solidFill>
                   <a:srgbClr val="B9BBC5"/>
                 </a:solidFill>
@@ -16259,7 +16354,7 @@
           <a:p>
             <a:pPr algn="ctr"/>
             <a:r>
-              <a:rPr lang="en-US" sz="1600" dirty="0">
+              <a:rPr lang="en-US" sz="1600">
                 <a:solidFill>
                   <a:schemeClr val="accent1">
                     <a:lumMod val="60000"/>
@@ -16271,7 +16366,7 @@
               <a:t>Feed-forward network</a:t>
             </a:r>
             <a:r>
-              <a:rPr lang="en-US" sz="1600" dirty="0">
+              <a:rPr lang="en-US" sz="1600">
                 <a:latin typeface="+mj-lt"/>
               </a:rPr>
               <a:t>:</a:t>
@@ -16280,7 +16375,7 @@
           <a:p>
             <a:pPr algn="ctr"/>
             <a:r>
-              <a:rPr lang="en-US" sz="1400" dirty="0">
+              <a:rPr lang="en-US" sz="1400">
                 <a:latin typeface="+mj-lt"/>
               </a:rPr>
               <a:t>after taking information from other tokens, take a moment to think and process this information </a:t>
@@ -16318,7 +16413,7 @@
           <a:p>
             <a:pPr algn="ctr"/>
             <a:r>
-              <a:rPr lang="en-US" sz="1600" dirty="0">
+              <a:rPr lang="en-US" sz="1600">
                 <a:solidFill>
                   <a:schemeClr val="accent2">
                     <a:lumMod val="75000"/>
@@ -16329,7 +16424,7 @@
               <a:t>Decoder</a:t>
             </a:r>
             <a:r>
-              <a:rPr lang="en-US" sz="1600" dirty="0">
+              <a:rPr lang="en-US" sz="1600">
                 <a:latin typeface="+mj-lt"/>
               </a:rPr>
               <a:t> self-attention (masked):</a:t>
@@ -16338,7 +16433,7 @@
           <a:p>
             <a:pPr algn="ctr"/>
             <a:r>
-              <a:rPr lang="en-US" sz="1400" dirty="0">
+              <a:rPr lang="en-US" sz="1400">
                 <a:latin typeface="+mj-lt"/>
               </a:rPr>
               <a:t>tokens look at previous tokens</a:t>
@@ -16347,7 +16442,7 @@
           <a:p>
             <a:pPr algn="ctr"/>
             <a:r>
-              <a:rPr lang="en-US" sz="1200" dirty="0">
+              <a:rPr lang="en-US" sz="1200">
                 <a:solidFill>
                   <a:srgbClr val="B9BBC5"/>
                 </a:solidFill>
@@ -16388,7 +16483,7 @@
           <a:p>
             <a:pPr algn="ctr"/>
             <a:r>
-              <a:rPr lang="en-US" sz="1600" dirty="0">
+              <a:rPr lang="en-US" sz="1600">
                 <a:solidFill>
                   <a:schemeClr val="accent2">
                     <a:lumMod val="75000"/>
@@ -16399,7 +16494,7 @@
               <a:t>Decoder</a:t>
             </a:r>
             <a:r>
-              <a:rPr lang="en-US" sz="1600" dirty="0">
+              <a:rPr lang="en-US" sz="1600">
                 <a:solidFill>
                   <a:schemeClr val="accent6">
                     <a:lumMod val="75000"/>
@@ -16410,7 +16505,7 @@
               <a:t> </a:t>
             </a:r>
             <a:r>
-              <a:rPr lang="en-US" sz="1600" dirty="0">
+              <a:rPr lang="en-US" sz="1600">
                 <a:solidFill>
                   <a:srgbClr val="041F41"/>
                 </a:solidFill>
@@ -16419,7 +16514,7 @@
               <a:t>-</a:t>
             </a:r>
             <a:r>
-              <a:rPr lang="en-US" sz="1600" dirty="0">
+              <a:rPr lang="en-US" sz="1600">
                 <a:solidFill>
                   <a:schemeClr val="accent6">
                     <a:lumMod val="75000"/>
@@ -16430,7 +16525,7 @@
               <a:t> Encoder</a:t>
             </a:r>
             <a:r>
-              <a:rPr lang="en-US" sz="1600" dirty="0">
+              <a:rPr lang="en-US" sz="1600">
                 <a:latin typeface="+mj-lt"/>
               </a:rPr>
               <a:t> self-attention:</a:t>
@@ -16439,7 +16534,7 @@
           <a:p>
             <a:pPr algn="ctr"/>
             <a:r>
-              <a:rPr lang="en-US" sz="1400" dirty="0">
+              <a:rPr lang="en-US" sz="1400">
                 <a:latin typeface="+mj-lt"/>
               </a:rPr>
               <a:t>target tokens look at the source</a:t>
@@ -16448,7 +16543,7 @@
           <a:p>
             <a:pPr algn="ctr"/>
             <a:r>
-              <a:rPr lang="en-US" sz="1200" dirty="0">
+              <a:rPr lang="en-US" sz="1200">
                 <a:solidFill>
                   <a:srgbClr val="B9BBC5"/>
                 </a:solidFill>
@@ -16489,7 +16584,7 @@
           <a:p>
             <a:pPr algn="ctr"/>
             <a:r>
-              <a:rPr lang="en-US" sz="1600" dirty="0">
+              <a:rPr lang="en-US" sz="1600">
                 <a:solidFill>
                   <a:schemeClr val="accent4">
                     <a:lumMod val="60000"/>
@@ -16533,7 +16628,7 @@
           <a:p>
             <a:pPr algn="ctr"/>
             <a:r>
-              <a:rPr lang="en-US" sz="1600" dirty="0">
+              <a:rPr lang="en-US" sz="1600">
                 <a:solidFill>
                   <a:schemeClr val="accent1">
                     <a:lumMod val="60000"/>
@@ -16545,7 +16640,7 @@
               <a:t>Feed-forward network</a:t>
             </a:r>
             <a:r>
-              <a:rPr lang="en-US" sz="1600" dirty="0">
+              <a:rPr lang="en-US" sz="1600">
                 <a:latin typeface="+mj-lt"/>
               </a:rPr>
               <a:t>:</a:t>
@@ -16554,7 +16649,7 @@
           <a:p>
             <a:pPr algn="ctr"/>
             <a:r>
-              <a:rPr lang="en-US" sz="1400" dirty="0">
+              <a:rPr lang="en-US" sz="1400">
                 <a:latin typeface="+mj-lt"/>
               </a:rPr>
               <a:t>after taking information from other tokens, take a moment to think and process this information </a:t>
@@ -16684,7 +16779,7 @@
           <a:p>
             <a:pPr algn="ctr"/>
             <a:r>
-              <a:rPr lang="en-US" sz="1600" dirty="0">
+              <a:rPr lang="en-US" sz="1600">
                 <a:solidFill>
                   <a:srgbClr val="605E63"/>
                 </a:solidFill>
@@ -16696,14 +16791,14 @@
           <a:p>
             <a:pPr algn="ctr"/>
             <a:r>
-              <a:rPr lang="en-US" sz="1200" dirty="0">
+              <a:rPr lang="en-US" sz="1200">
                 <a:solidFill>
                   <a:srgbClr val="B9BBC5"/>
                 </a:solidFill>
               </a:rPr>
               <a:t>attention + query</a:t>
             </a:r>
-            <a:endParaRPr lang="en-US" sz="1200" dirty="0">
+            <a:endParaRPr lang="en-US" sz="1200">
               <a:solidFill>
                 <a:srgbClr val="605E63"/>
               </a:solidFill>
@@ -16742,7 +16837,7 @@
           <a:p>
             <a:pPr algn="ctr"/>
             <a:r>
-              <a:rPr lang="en-US" sz="1600" dirty="0">
+              <a:rPr lang="en-US" sz="1600">
                 <a:solidFill>
                   <a:srgbClr val="605E63"/>
                 </a:solidFill>
@@ -16754,14 +16849,14 @@
           <a:p>
             <a:pPr algn="ctr"/>
             <a:r>
-              <a:rPr lang="en-US" sz="1200" dirty="0">
+              <a:rPr lang="en-US" sz="1200">
                 <a:solidFill>
                   <a:srgbClr val="B9BBC5"/>
                 </a:solidFill>
               </a:rPr>
               <a:t>attention + query</a:t>
             </a:r>
-            <a:endParaRPr lang="en-US" sz="1200" dirty="0">
+            <a:endParaRPr lang="en-US" sz="1200">
               <a:solidFill>
                 <a:srgbClr val="605E63"/>
               </a:solidFill>
@@ -16936,7 +17031,7 @@
           <a:lstStyle/>
           <a:p>
             <a:r>
-              <a:rPr lang="en-US" sz="1200" dirty="0">
+              <a:rPr lang="en-US" sz="1200">
                 <a:solidFill>
                   <a:schemeClr val="accent2">
                     <a:lumMod val="50000"/>
@@ -16977,7 +17072,7 @@
           <a:lstStyle/>
           <a:p>
             <a:r>
-              <a:rPr lang="en-US" sz="1200" dirty="0">
+              <a:rPr lang="en-US" sz="1200">
                 <a:solidFill>
                   <a:schemeClr val="accent2">
                     <a:lumMod val="50000"/>
@@ -17018,7 +17113,7 @@
           <a:lstStyle/>
           <a:p>
             <a:r>
-              <a:rPr lang="en-US" sz="1200" dirty="0">
+              <a:rPr lang="en-US" sz="1200">
                 <a:solidFill>
                   <a:schemeClr val="accent2">
                     <a:lumMod val="50000"/>
@@ -17059,7 +17154,7 @@
           <a:lstStyle/>
           <a:p>
             <a:r>
-              <a:rPr lang="en-US" sz="1200" dirty="0">
+              <a:rPr lang="en-US" sz="1200">
                 <a:solidFill>
                   <a:schemeClr val="accent2">
                     <a:lumMod val="50000"/>
@@ -17100,7 +17195,7 @@
           <a:lstStyle/>
           <a:p>
             <a:r>
-              <a:rPr lang="en-US" sz="1200" dirty="0">
+              <a:rPr lang="en-US" sz="1200">
                 <a:solidFill>
                   <a:schemeClr val="accent2">
                     <a:lumMod val="50000"/>
@@ -17141,7 +17236,7 @@
           <a:lstStyle/>
           <a:p>
             <a:r>
-              <a:rPr lang="en-US" sz="1200" dirty="0">
+              <a:rPr lang="en-US" sz="1200">
                 <a:solidFill>
                   <a:schemeClr val="accent2">
                     <a:lumMod val="50000"/>
@@ -17182,7 +17277,7 @@
           <a:lstStyle/>
           <a:p>
             <a:r>
-              <a:rPr lang="en-US" sz="1200" dirty="0">
+              <a:rPr lang="en-US" sz="1200">
                 <a:solidFill>
                   <a:schemeClr val="accent2">
                     <a:lumMod val="50000"/>
@@ -17223,7 +17318,7 @@
           <a:lstStyle/>
           <a:p>
             <a:r>
-              <a:rPr lang="en-US" sz="1200" dirty="0">
+              <a:rPr lang="en-US" sz="1200">
                 <a:solidFill>
                   <a:schemeClr val="accent2">
                     <a:lumMod val="50000"/>
@@ -17264,7 +17359,7 @@
           <a:lstStyle/>
           <a:p>
             <a:r>
-              <a:rPr lang="en-US" sz="1200" dirty="0">
+              <a:rPr lang="en-US" sz="1200">
                 <a:solidFill>
                   <a:schemeClr val="accent2">
                     <a:lumMod val="50000"/>
@@ -18390,7 +18485,7 @@
           <a:lstStyle/>
           <a:p>
             <a:r>
-              <a:rPr lang="en-US" dirty="0">
+              <a:rPr lang="en-US">
                 <a:solidFill>
                   <a:srgbClr val="041F41"/>
                 </a:solidFill>
@@ -18538,7 +18633,7 @@
               <a:lstStyle/>
               <a:p>
                 <a:pPr algn="ctr"/>
-                <a:endParaRPr lang="en-US" dirty="0">
+                <a:endParaRPr lang="en-US">
                   <a:latin typeface="Bogle" charset="0"/>
                   <a:ea typeface="Bogle" charset="0"/>
                   <a:cs typeface="Bogle" charset="0"/>
@@ -18694,7 +18789,7 @@
                   <a:defRPr/>
                 </a:pPr>
                 <a:r>
-                  <a:rPr kumimoji="0" lang="en-US" sz="1600" i="0" u="none" strike="noStrike" kern="1200" cap="none" spc="0" normalizeH="0" baseline="0" noProof="0" dirty="0">
+                  <a:rPr kumimoji="0" lang="en-US" sz="1600" i="0" u="none" strike="noStrike" kern="1200" cap="none" spc="0" normalizeH="0" baseline="0" noProof="0">
                     <a:ln>
                       <a:noFill/>
                     </a:ln>
@@ -18765,7 +18860,7 @@
             <a:lstStyle/>
             <a:p>
               <a:pPr algn="ctr"/>
-              <a:endParaRPr lang="en-US" dirty="0">
+              <a:endParaRPr lang="en-US">
                 <a:solidFill>
                   <a:schemeClr val="accent1">
                     <a:lumMod val="50000"/>
@@ -18817,7 +18912,7 @@
               <a:defRPr/>
             </a:pPr>
             <a:r>
-              <a:rPr lang="en-US" sz="1400" dirty="0">
+              <a:rPr lang="en-US" sz="1400">
                 <a:solidFill>
                   <a:srgbClr val="605E63"/>
                 </a:solidFill>
@@ -18925,7 +19020,7 @@
               <a:lstStyle/>
               <a:p>
                 <a:pPr algn="ctr"/>
-                <a:endParaRPr lang="en-US" dirty="0">
+                <a:endParaRPr lang="en-US">
                   <a:latin typeface="Bogle" charset="0"/>
                   <a:ea typeface="Bogle" charset="0"/>
                   <a:cs typeface="Bogle" charset="0"/>
@@ -19070,7 +19165,7 @@
                   <a:defRPr/>
                 </a:pPr>
                 <a:r>
-                  <a:rPr lang="en-US" sz="1600" dirty="0">
+                  <a:rPr lang="en-US" sz="1600">
                     <a:solidFill>
                       <a:schemeClr val="bg1"/>
                     </a:solidFill>
@@ -19080,7 +19175,7 @@
                   </a:rPr>
                   <a:t>Data Pipeline</a:t>
                 </a:r>
-                <a:endParaRPr kumimoji="0" lang="en-US" sz="1600" i="0" u="none" strike="noStrike" kern="1200" cap="none" spc="0" normalizeH="0" baseline="0" noProof="0" dirty="0">
+                <a:endParaRPr kumimoji="0" lang="en-US" sz="1600" i="0" u="none" strike="noStrike" kern="1200" cap="none" spc="0" normalizeH="0" baseline="0" noProof="0">
                   <a:ln>
                     <a:noFill/>
                   </a:ln>
@@ -19403,7 +19498,7 @@
                   <a:defRPr/>
                 </a:pPr>
                 <a:r>
-                  <a:rPr kumimoji="0" lang="en-US" sz="1600" i="0" u="none" strike="noStrike" kern="1200" cap="none" spc="0" normalizeH="0" baseline="0" noProof="0" dirty="0">
+                  <a:rPr kumimoji="0" lang="en-US" sz="1600" i="0" u="none" strike="noStrike" kern="1200" cap="none" spc="0" normalizeH="0" baseline="0" noProof="0">
                     <a:ln>
                       <a:noFill/>
                     </a:ln>
@@ -19728,7 +19823,7 @@
                   <a:defRPr/>
                 </a:pPr>
                 <a:r>
-                  <a:rPr lang="en-US" sz="1600" dirty="0">
+                  <a:rPr lang="en-US" sz="1600">
                     <a:solidFill>
                       <a:schemeClr val="bg1"/>
                     </a:solidFill>
@@ -19738,7 +19833,7 @@
                   </a:rPr>
                   <a:t>Train &amp; Test</a:t>
                 </a:r>
-                <a:endParaRPr kumimoji="0" lang="en-US" sz="1600" i="0" u="none" strike="noStrike" kern="1200" cap="none" spc="0" normalizeH="0" baseline="0" noProof="0" dirty="0">
+                <a:endParaRPr kumimoji="0" lang="en-US" sz="1600" i="0" u="none" strike="noStrike" kern="1200" cap="none" spc="0" normalizeH="0" baseline="0" noProof="0">
                   <a:ln>
                     <a:noFill/>
                   </a:ln>
@@ -20061,7 +20156,7 @@
                   <a:defRPr/>
                 </a:pPr>
                 <a:r>
-                  <a:rPr lang="en-US" sz="1600" dirty="0">
+                  <a:rPr lang="en-US" sz="1600">
                     <a:solidFill>
                       <a:schemeClr val="bg1"/>
                     </a:solidFill>
@@ -20071,7 +20166,7 @@
                   </a:rPr>
                   <a:t>Analysis</a:t>
                 </a:r>
-                <a:endParaRPr kumimoji="0" lang="en-US" sz="1600" i="0" u="none" strike="noStrike" kern="1200" cap="none" spc="0" normalizeH="0" baseline="0" noProof="0" dirty="0">
+                <a:endParaRPr kumimoji="0" lang="en-US" sz="1600" i="0" u="none" strike="noStrike" kern="1200" cap="none" spc="0" normalizeH="0" baseline="0" noProof="0">
                   <a:ln>
                     <a:noFill/>
                   </a:ln>
@@ -20404,7 +20499,7 @@
           <a:p>
             <a:pPr algn="ctr"/>
             <a:r>
-              <a:rPr lang="en-US" sz="1400" b="0" i="0" u="none" strike="noStrike" dirty="0">
+              <a:rPr lang="en-US" sz="1400" b="0" i="0" u="none" strike="noStrike">
                 <a:solidFill>
                   <a:srgbClr val="605E63"/>
                 </a:solidFill>
@@ -20414,7 +20509,7 @@
               <a:t>Created pipeline to efficiently read dataset into </a:t>
             </a:r>
             <a:r>
-              <a:rPr lang="en-US" sz="1400" dirty="0">
+              <a:rPr lang="en-US" sz="1400">
                 <a:solidFill>
                   <a:srgbClr val="605E63"/>
                 </a:solidFill>
@@ -20460,7 +20555,7 @@
               <a:defRPr/>
             </a:pPr>
             <a:r>
-              <a:rPr lang="en-US" sz="1400" dirty="0">
+              <a:rPr lang="en-US" sz="1400">
                 <a:solidFill>
                   <a:srgbClr val="605E63"/>
                 </a:solidFill>
@@ -20508,7 +20603,7 @@
               <a:defRPr/>
             </a:pPr>
             <a:r>
-              <a:rPr lang="en-US" sz="1400" dirty="0">
+              <a:rPr lang="en-US" sz="1400">
                 <a:solidFill>
                   <a:srgbClr val="605E63"/>
                 </a:solidFill>
@@ -20556,7 +20651,7 @@
               <a:defRPr/>
             </a:pPr>
             <a:r>
-              <a:rPr lang="en-US" sz="1400" dirty="0">
+              <a:rPr lang="en-US" sz="1400">
                 <a:solidFill>
                   <a:srgbClr val="605E63"/>
                 </a:solidFill>
@@ -21215,7 +21310,7 @@
           <a:lstStyle/>
           <a:p>
             <a:r>
-              <a:rPr lang="en-US" dirty="0">
+              <a:rPr lang="en-US">
                 <a:solidFill>
                   <a:srgbClr val="041F41"/>
                 </a:solidFill>
@@ -21628,7 +21723,7 @@
               <a:defRPr/>
             </a:pPr>
             <a:r>
-              <a:rPr lang="en-US" b="1" dirty="0">
+              <a:rPr lang="en-US" b="1">
                 <a:solidFill>
                   <a:srgbClr val="041F41"/>
                 </a:solidFill>
@@ -21638,7 +21733,7 @@
               </a:rPr>
               <a:t>DATA PIPELINE</a:t>
             </a:r>
-            <a:endParaRPr lang="en-US" dirty="0">
+            <a:endParaRPr lang="en-US">
               <a:solidFill>
                 <a:srgbClr val="041F41"/>
               </a:solidFill>
@@ -21971,7 +22066,7 @@
               <a:lstStyle/>
               <a:p>
                 <a:r>
-                  <a:rPr lang="en-US" sz="1400" b="1" dirty="0">
+                  <a:rPr lang="en-US" sz="1400" b="1">
                     <a:solidFill>
                       <a:schemeClr val="bg1"/>
                     </a:solidFill>
@@ -22019,7 +22114,7 @@
                   <a:defRPr/>
                 </a:pPr>
                 <a:r>
-                  <a:rPr lang="en-US" sz="1000" dirty="0">
+                  <a:rPr lang="en-US" sz="1000">
                     <a:solidFill>
                       <a:schemeClr val="bg1"/>
                     </a:solidFill>
@@ -22068,7 +22163,7 @@
                 <a:defRPr/>
               </a:pPr>
               <a:r>
-                <a:rPr lang="en-US" sz="1000" dirty="0">
+                <a:rPr lang="en-US" sz="1000">
                   <a:solidFill>
                     <a:srgbClr val="605E63"/>
                   </a:solidFill>
@@ -22347,7 +22442,7 @@
               <a:p>
                 <a:pPr algn="r"/>
                 <a:r>
-                  <a:rPr lang="en-US" sz="1400" b="1" dirty="0">
+                  <a:rPr lang="en-US" sz="1400" b="1">
                     <a:solidFill>
                       <a:schemeClr val="bg1"/>
                     </a:solidFill>
@@ -22395,7 +22490,7 @@
                   <a:defRPr/>
                 </a:pPr>
                 <a:r>
-                  <a:rPr lang="en-US" sz="1000" dirty="0">
+                  <a:rPr lang="en-US" sz="1000">
                     <a:solidFill>
                       <a:schemeClr val="bg1"/>
                     </a:solidFill>
@@ -22444,7 +22539,7 @@
                 <a:defRPr/>
               </a:pPr>
               <a:r>
-                <a:rPr lang="en-US" sz="1000" dirty="0">
+                <a:rPr lang="en-US" sz="1000">
                   <a:solidFill>
                     <a:srgbClr val="605E63"/>
                   </a:solidFill>
@@ -22551,7 +22646,7 @@
               <a:defRPr/>
             </a:pPr>
             <a:r>
-              <a:rPr lang="en-US" b="1" dirty="0">
+              <a:rPr lang="en-US" b="1">
                 <a:solidFill>
                   <a:srgbClr val="041F41"/>
                 </a:solidFill>
@@ -22561,7 +22656,7 @@
               </a:rPr>
               <a:t>ATTENTION</a:t>
             </a:r>
-            <a:endParaRPr lang="en-US" dirty="0">
+            <a:endParaRPr lang="en-US">
               <a:solidFill>
                 <a:srgbClr val="041F41"/>
               </a:solidFill>
@@ -22607,7 +22702,7 @@
               <a:defRPr/>
             </a:pPr>
             <a:r>
-              <a:rPr lang="en-US" sz="1100" dirty="0">
+              <a:rPr lang="en-US" sz="1100">
                 <a:solidFill>
                   <a:srgbClr val="041F41"/>
                 </a:solidFill>
@@ -22655,7 +22750,7 @@
               <a:defRPr/>
             </a:pPr>
             <a:r>
-              <a:rPr lang="en-US" sz="1100" dirty="0">
+              <a:rPr lang="en-US" sz="1100">
                 <a:solidFill>
                   <a:srgbClr val="041F41"/>
                 </a:solidFill>

</xml_diff>